<commit_message>
report issues completed and modified
</commit_message>
<xml_diff>
--- a/Docs/evenza,pptx.pptx
+++ b/Docs/evenza,pptx.pptx
@@ -5,7 +5,7 @@
     <p:sldMasterId id="2147483648" r:id="rId1"/>
   </p:sldMasterIdLst>
   <p:notesMasterIdLst>
-    <p:notesMasterId r:id="rId14"/>
+    <p:notesMasterId r:id="rId12"/>
   </p:notesMasterIdLst>
   <p:sldIdLst>
     <p:sldId id="257" r:id="rId3"/>
@@ -13,16 +13,16 @@
     <p:sldId id="260" r:id="rId5"/>
     <p:sldId id="262" r:id="rId6"/>
     <p:sldId id="263" r:id="rId7"/>
-    <p:sldId id="272" r:id="rId8"/>
-    <p:sldId id="270" r:id="rId9"/>
-    <p:sldId id="267" r:id="rId10"/>
-    <p:sldId id="268" r:id="rId11"/>
-    <p:sldId id="266" r:id="rId12"/>
-    <p:sldId id="265" r:id="rId13"/>
-    <p:sldId id="291" r:id="rId15"/>
-    <p:sldId id="292" r:id="rId16"/>
-    <p:sldId id="293" r:id="rId17"/>
-    <p:sldId id="271" r:id="rId18"/>
+    <p:sldId id="267" r:id="rId8"/>
+    <p:sldId id="268" r:id="rId9"/>
+    <p:sldId id="266" r:id="rId10"/>
+    <p:sldId id="265" r:id="rId11"/>
+    <p:sldId id="270" r:id="rId13"/>
+    <p:sldId id="291" r:id="rId14"/>
+    <p:sldId id="292" r:id="rId15"/>
+    <p:sldId id="293" r:id="rId16"/>
+    <p:sldId id="271" r:id="rId17"/>
+    <p:sldId id="295" r:id="rId18"/>
   </p:sldIdLst>
   <p:sldSz cx="12192000" cy="6858000"/>
   <p:notesSz cx="7103745" cy="10234295"/>
@@ -5684,7 +5684,7 @@
         </p:spPr>
         <p:txBody>
           <a:bodyPr>
-            <a:normAutofit fontScale="90000"/>
+            <a:normAutofit/>
           </a:bodyPr>
           <a:lstStyle/>
           <a:p>
@@ -5697,26 +5697,7 @@
                   </a:schemeClr>
                 </a:solidFill>
               </a:rPr>
-              <a:t>Other Libraries &amp;</a:t>
-            </a:r>
-            <a:br>
-              <a:rPr lang="en-US" altLang="en-US" sz="4800" b="1" dirty="0">
-                <a:solidFill>
-                  <a:schemeClr val="accent2">
-                    <a:lumMod val="50000"/>
-                  </a:schemeClr>
-                </a:solidFill>
-              </a:rPr>
-            </a:br>
-            <a:r>
-              <a:rPr lang="en-US" altLang="en-US" sz="4800" b="1" dirty="0">
-                <a:solidFill>
-                  <a:schemeClr val="accent2">
-                    <a:lumMod val="50000"/>
-                  </a:schemeClr>
-                </a:solidFill>
-              </a:rPr>
-              <a:t>Frameworks</a:t>
+              <a:t>Demonstration</a:t>
             </a:r>
             <a:endParaRPr lang="en-US" altLang="en-US" sz="4800" b="1" dirty="0">
               <a:solidFill>
@@ -5836,424 +5817,13 @@
   <p:clrMapOvr>
     <a:masterClrMapping/>
   </p:clrMapOvr>
-  <p:transition/>
+  <p:transition>
+    <p:fade thruBlk="1"/>
+  </p:transition>
 </p:sld>
 </file>
 
 <file path=ppt/slides/slide11.xml><?xml version="1.0" encoding="utf-8"?>
-<p:sld xmlns:a="http://schemas.openxmlformats.org/drawingml/2006/main" xmlns:r="http://schemas.openxmlformats.org/officeDocument/2006/relationships" xmlns:p="http://schemas.openxmlformats.org/presentationml/2006/main">
-  <p:cSld>
-    <p:spTree>
-      <p:nvGrpSpPr>
-        <p:cNvPr id="1" name=""/>
-        <p:cNvGrpSpPr/>
-        <p:nvPr/>
-      </p:nvGrpSpPr>
-      <p:grpSpPr>
-        <a:xfrm>
-          <a:off x="0" y="0"/>
-          <a:ext cx="0" cy="0"/>
-          <a:chOff x="0" y="0"/>
-          <a:chExt cx="0" cy="0"/>
-        </a:xfrm>
-      </p:grpSpPr>
-      <p:sp>
-        <p:nvSpPr>
-          <p:cNvPr id="2" name="Title 1"/>
-          <p:cNvSpPr>
-            <a:spLocks noGrp="1"/>
-          </p:cNvSpPr>
-          <p:nvPr>
-            <p:ph type="title"/>
-          </p:nvPr>
-        </p:nvSpPr>
-        <p:spPr>
-          <a:xfrm>
-            <a:off x="563245" y="407670"/>
-            <a:ext cx="10515600" cy="1325563"/>
-          </a:xfrm>
-        </p:spPr>
-        <p:txBody>
-          <a:bodyPr/>
-          <a:lstStyle/>
-          <a:p>
-            <a:pPr algn="l"/>
-            <a:r>
-              <a:rPr lang="en-US" altLang="en-US" b="1" dirty="0">
-                <a:solidFill>
-                  <a:schemeClr val="accent5">
-                    <a:lumMod val="50000"/>
-                  </a:schemeClr>
-                </a:solidFill>
-                <a:latin typeface="+mn-lt"/>
-                <a:cs typeface="+mn-lt"/>
-              </a:rPr>
-              <a:t>Libraries/ Frameworks used..</a:t>
-            </a:r>
-            <a:endParaRPr lang="en-US" altLang="en-US" b="1" dirty="0">
-              <a:solidFill>
-                <a:schemeClr val="accent5">
-                  <a:lumMod val="50000"/>
-                </a:schemeClr>
-              </a:solidFill>
-              <a:latin typeface="+mn-lt"/>
-              <a:cs typeface="+mn-lt"/>
-            </a:endParaRPr>
-          </a:p>
-        </p:txBody>
-      </p:sp>
-      <p:sp>
-        <p:nvSpPr>
-          <p:cNvPr id="24" name="Rectangle 23"/>
-          <p:cNvSpPr/>
-          <p:nvPr/>
-        </p:nvSpPr>
-        <p:spPr bwMode="auto">
-          <a:xfrm>
-            <a:off x="433705" y="6459220"/>
-            <a:ext cx="11758295" cy="403860"/>
-          </a:xfrm>
-          <a:prstGeom prst="rect">
-            <a:avLst/>
-          </a:prstGeom>
-          <a:gradFill flip="none" rotWithShape="1">
-            <a:gsLst>
-              <a:gs pos="0">
-                <a:schemeClr val="accent1">
-                  <a:alpha val="80000"/>
-                </a:schemeClr>
-              </a:gs>
-              <a:gs pos="100000">
-                <a:schemeClr val="accent2">
-                  <a:alpha val="80000"/>
-                </a:schemeClr>
-              </a:gs>
-            </a:gsLst>
-            <a:lin ang="5400000" scaled="0"/>
-            <a:tileRect/>
-          </a:gradFill>
-          <a:ln w="9525">
-            <a:noFill/>
-            <a:round/>
-          </a:ln>
-        </p:spPr>
-        <p:txBody>
-          <a:bodyPr vert="horz" wrap="square" lIns="121920" tIns="60960" rIns="121920" bIns="60960" numCol="1" rtlCol="0" anchor="t" anchorCtr="0" compatLnSpc="1"/>
-          <a:p>
-            <a:pPr algn="ctr"/>
-            <a:endParaRPr lang="en-US" sz="2400"/>
-          </a:p>
-        </p:txBody>
-      </p:sp>
-      <p:sp>
-        <p:nvSpPr>
-          <p:cNvPr id="8" name="Rectangle 7"/>
-          <p:cNvSpPr/>
-          <p:nvPr/>
-        </p:nvSpPr>
-        <p:spPr bwMode="auto">
-          <a:xfrm>
-            <a:off x="0" y="-327660"/>
-            <a:ext cx="434340" cy="1778000"/>
-          </a:xfrm>
-          <a:prstGeom prst="rect">
-            <a:avLst/>
-          </a:prstGeom>
-          <a:gradFill flip="none" rotWithShape="1">
-            <a:gsLst>
-              <a:gs pos="0">
-                <a:schemeClr val="accent1">
-                  <a:alpha val="80000"/>
-                </a:schemeClr>
-              </a:gs>
-              <a:gs pos="100000">
-                <a:schemeClr val="accent2">
-                  <a:alpha val="80000"/>
-                </a:schemeClr>
-              </a:gs>
-            </a:gsLst>
-            <a:lin ang="5400000" scaled="0"/>
-            <a:tileRect/>
-          </a:gradFill>
-          <a:ln w="9525">
-            <a:noFill/>
-            <a:round/>
-          </a:ln>
-        </p:spPr>
-        <p:txBody>
-          <a:bodyPr vert="horz" wrap="square" lIns="121920" tIns="60960" rIns="121920" bIns="60960" numCol="1" rtlCol="0" anchor="t" anchorCtr="0" compatLnSpc="1"/>
-          <a:p>
-            <a:pPr algn="ctr"/>
-            <a:endParaRPr lang="en-US" sz="2400"/>
-          </a:p>
-        </p:txBody>
-      </p:sp>
-      <p:sp>
-        <p:nvSpPr>
-          <p:cNvPr id="6" name="Content Placeholder 5"/>
-          <p:cNvSpPr>
-            <a:spLocks noGrp="1"/>
-          </p:cNvSpPr>
-          <p:nvPr>
-            <p:ph idx="1"/>
-          </p:nvPr>
-        </p:nvSpPr>
-        <p:spPr>
-          <a:xfrm>
-            <a:off x="823595" y="1665605"/>
-            <a:ext cx="10544175" cy="4394835"/>
-          </a:xfrm>
-        </p:spPr>
-        <p:txBody>
-          <a:bodyPr>
-            <a:normAutofit fontScale="90000"/>
-          </a:bodyPr>
-          <a:p>
-            <a:pPr algn="l">
-              <a:lnSpc>
-                <a:spcPct val="150000"/>
-              </a:lnSpc>
-            </a:pPr>
-            <a:r>
-              <a:rPr lang="" altLang="en-US" sz="2000" b="1" dirty="0">
-                <a:solidFill>
-                  <a:schemeClr val="accent1">
-                    <a:lumMod val="50000"/>
-                  </a:schemeClr>
-                </a:solidFill>
-                <a:cs typeface="+mn-lt"/>
-              </a:rPr>
-              <a:t>Angular Material - UI Library</a:t>
-            </a:r>
-            <a:endParaRPr lang="en-US" altLang="en-US" sz="2000" b="1" dirty="0">
-              <a:solidFill>
-                <a:schemeClr val="accent1">
-                  <a:lumMod val="50000"/>
-                </a:schemeClr>
-              </a:solidFill>
-              <a:cs typeface="+mn-lt"/>
-            </a:endParaRPr>
-          </a:p>
-          <a:p>
-            <a:pPr algn="l">
-              <a:lnSpc>
-                <a:spcPct val="150000"/>
-              </a:lnSpc>
-            </a:pPr>
-            <a:r>
-              <a:rPr lang="en-US" altLang="en-US" sz="2000" b="1" dirty="0">
-                <a:solidFill>
-                  <a:schemeClr val="accent1">
-                    <a:lumMod val="50000"/>
-                  </a:schemeClr>
-                </a:solidFill>
-                <a:cs typeface="+mn-lt"/>
-              </a:rPr>
-              <a:t>Multer - Image uploading &amp; handeling</a:t>
-            </a:r>
-            <a:endParaRPr lang="en-US" altLang="en-US" sz="2000" b="1" dirty="0">
-              <a:solidFill>
-                <a:schemeClr val="accent1">
-                  <a:lumMod val="50000"/>
-                </a:schemeClr>
-              </a:solidFill>
-              <a:cs typeface="+mn-lt"/>
-            </a:endParaRPr>
-          </a:p>
-          <a:p>
-            <a:pPr algn="l">
-              <a:lnSpc>
-                <a:spcPct val="150000"/>
-              </a:lnSpc>
-            </a:pPr>
-            <a:r>
-              <a:rPr lang="en-US" altLang="en-US" sz="2000" b="1" dirty="0">
-                <a:solidFill>
-                  <a:schemeClr val="accent1">
-                    <a:lumMod val="50000"/>
-                  </a:schemeClr>
-                </a:solidFill>
-                <a:cs typeface="+mn-lt"/>
-              </a:rPr>
-              <a:t>Body Parser - JSON object Parsing</a:t>
-            </a:r>
-            <a:endParaRPr lang="en-US" altLang="en-US" sz="2000" b="1" dirty="0">
-              <a:solidFill>
-                <a:schemeClr val="accent1">
-                  <a:lumMod val="50000"/>
-                </a:schemeClr>
-              </a:solidFill>
-              <a:cs typeface="+mn-lt"/>
-            </a:endParaRPr>
-          </a:p>
-          <a:p>
-            <a:pPr algn="l">
-              <a:lnSpc>
-                <a:spcPct val="150000"/>
-              </a:lnSpc>
-            </a:pPr>
-            <a:r>
-              <a:rPr lang="en-US" altLang="en-US" sz="2000" b="1" dirty="0">
-                <a:solidFill>
-                  <a:schemeClr val="accent1">
-                    <a:lumMod val="50000"/>
-                  </a:schemeClr>
-                </a:solidFill>
-                <a:cs typeface="+mn-lt"/>
-              </a:rPr>
-              <a:t>Mongoose - Secure MongoDB database controller</a:t>
-            </a:r>
-            <a:endParaRPr lang="en-US" altLang="en-US" sz="2000" b="1" dirty="0">
-              <a:solidFill>
-                <a:schemeClr val="accent1">
-                  <a:lumMod val="50000"/>
-                </a:schemeClr>
-              </a:solidFill>
-              <a:cs typeface="+mn-lt"/>
-            </a:endParaRPr>
-          </a:p>
-          <a:p>
-            <a:pPr algn="l">
-              <a:lnSpc>
-                <a:spcPct val="150000"/>
-              </a:lnSpc>
-            </a:pPr>
-            <a:r>
-              <a:rPr lang="en-US" altLang="en-US" sz="2000" b="1" dirty="0">
-                <a:solidFill>
-                  <a:schemeClr val="accent1">
-                    <a:lumMod val="50000"/>
-                  </a:schemeClr>
-                </a:solidFill>
-                <a:cs typeface="+mn-lt"/>
-              </a:rPr>
-              <a:t>JSON Web Tokens - Secure Authentication &amp; Authorization</a:t>
-            </a:r>
-            <a:endParaRPr lang="en-US" altLang="en-US" sz="2000" b="1" dirty="0">
-              <a:solidFill>
-                <a:schemeClr val="accent1">
-                  <a:lumMod val="50000"/>
-                </a:schemeClr>
-              </a:solidFill>
-              <a:cs typeface="+mn-lt"/>
-            </a:endParaRPr>
-          </a:p>
-          <a:p>
-            <a:pPr algn="l">
-              <a:lnSpc>
-                <a:spcPct val="150000"/>
-              </a:lnSpc>
-            </a:pPr>
-            <a:r>
-              <a:rPr lang="en-US" altLang="en-US" sz="2000" b="1" dirty="0">
-                <a:solidFill>
-                  <a:schemeClr val="accent1">
-                    <a:lumMod val="50000"/>
-                  </a:schemeClr>
-                </a:solidFill>
-                <a:cs typeface="+mn-lt"/>
-              </a:rPr>
-              <a:t>Nodemailer - Email message handeling</a:t>
-            </a:r>
-            <a:endParaRPr lang="en-US" altLang="en-US" sz="2000" b="1" dirty="0">
-              <a:solidFill>
-                <a:schemeClr val="accent1">
-                  <a:lumMod val="50000"/>
-                </a:schemeClr>
-              </a:solidFill>
-              <a:cs typeface="+mn-lt"/>
-            </a:endParaRPr>
-          </a:p>
-          <a:p>
-            <a:pPr algn="l">
-              <a:lnSpc>
-                <a:spcPct val="150000"/>
-              </a:lnSpc>
-            </a:pPr>
-            <a:r>
-              <a:rPr lang="en-US" altLang="en-US" sz="2000" b="1" dirty="0">
-                <a:solidFill>
-                  <a:schemeClr val="accent1">
-                    <a:lumMod val="50000"/>
-                  </a:schemeClr>
-                </a:solidFill>
-                <a:cs typeface="+mn-lt"/>
-              </a:rPr>
-              <a:t>JsPDF &amp; htmlCanvas - Report extracting &amp; printing</a:t>
-            </a:r>
-            <a:endParaRPr lang="en-US" altLang="en-US" sz="2000" b="1" dirty="0">
-              <a:solidFill>
-                <a:schemeClr val="accent1">
-                  <a:lumMod val="50000"/>
-                </a:schemeClr>
-              </a:solidFill>
-              <a:cs typeface="+mn-lt"/>
-            </a:endParaRPr>
-          </a:p>
-          <a:p>
-            <a:pPr algn="l">
-              <a:lnSpc>
-                <a:spcPct val="150000"/>
-              </a:lnSpc>
-            </a:pPr>
-            <a:r>
-              <a:rPr lang="en-US" altLang="en-US" sz="2000" b="1" dirty="0">
-                <a:solidFill>
-                  <a:schemeClr val="accent1">
-                    <a:lumMod val="50000"/>
-                  </a:schemeClr>
-                </a:solidFill>
-                <a:cs typeface="+mn-lt"/>
-              </a:rPr>
-              <a:t>chart.js - Data visualization &amp; Report generation</a:t>
-            </a:r>
-            <a:endParaRPr lang="en-US" altLang="en-US" sz="2000" b="1" dirty="0">
-              <a:solidFill>
-                <a:schemeClr val="accent1">
-                  <a:lumMod val="50000"/>
-                </a:schemeClr>
-              </a:solidFill>
-              <a:cs typeface="+mn-lt"/>
-            </a:endParaRPr>
-          </a:p>
-          <a:p>
-            <a:pPr algn="l">
-              <a:lnSpc>
-                <a:spcPct val="150000"/>
-              </a:lnSpc>
-            </a:pPr>
-            <a:r>
-              <a:rPr lang="" altLang="en-US" sz="2000" b="1" dirty="0">
-                <a:solidFill>
-                  <a:schemeClr val="accent1">
-                    <a:lumMod val="50000"/>
-                  </a:schemeClr>
-                </a:solidFill>
-                <a:cs typeface="+mn-lt"/>
-              </a:rPr>
-              <a:t>Google Maps API - Location Services</a:t>
-            </a:r>
-            <a:endParaRPr lang="" altLang="en-US" sz="2000" b="1" dirty="0">
-              <a:solidFill>
-                <a:schemeClr val="accent1">
-                  <a:lumMod val="50000"/>
-                </a:schemeClr>
-              </a:solidFill>
-              <a:cs typeface="+mn-lt"/>
-            </a:endParaRPr>
-          </a:p>
-        </p:txBody>
-      </p:sp>
-    </p:spTree>
-  </p:cSld>
-  <p:clrMapOvr>
-    <a:masterClrMapping/>
-  </p:clrMapOvr>
-  <p:transition/>
-</p:sld>
-</file>
-
-<file path=ppt/slides/slide12.xml><?xml version="1.0" encoding="utf-8"?>
 <p:sld xmlns:a="http://schemas.openxmlformats.org/drawingml/2006/main" xmlns:r="http://schemas.openxmlformats.org/officeDocument/2006/relationships" xmlns:p="http://schemas.openxmlformats.org/presentationml/2006/main" show="0">
   <p:cSld>
     <p:spTree>
@@ -6481,7 +6051,7 @@
 </p:sld>
 </file>
 
-<file path=ppt/slides/slide13.xml><?xml version="1.0" encoding="utf-8"?>
+<file path=ppt/slides/slide12.xml><?xml version="1.0" encoding="utf-8"?>
 <p:sld xmlns:a="http://schemas.openxmlformats.org/drawingml/2006/main" xmlns:r="http://schemas.openxmlformats.org/officeDocument/2006/relationships" xmlns:p="http://schemas.openxmlformats.org/presentationml/2006/main" show="0">
   <p:cSld>
     <p:spTree>
@@ -7545,7 +7115,7 @@
 </p:sld>
 </file>
 
-<file path=ppt/slides/slide14.xml><?xml version="1.0" encoding="utf-8"?>
+<file path=ppt/slides/slide13.xml><?xml version="1.0" encoding="utf-8"?>
 <p:sld xmlns:a="http://schemas.openxmlformats.org/drawingml/2006/main" xmlns:r="http://schemas.openxmlformats.org/officeDocument/2006/relationships" xmlns:p="http://schemas.openxmlformats.org/presentationml/2006/main" show="0">
   <p:cSld>
     <p:spTree>
@@ -8302,7 +7872,7 @@
       </p:sp>
       <p:pic>
         <p:nvPicPr>
-          <p:cNvPr id="2" name="Picture 1"/>
+          <p:cNvPr id="16" name="Picture 15"/>
           <p:cNvPicPr>
             <a:picLocks noChangeAspect="1"/>
           </p:cNvPicPr>
@@ -8316,8 +7886,8 @@
         </p:blipFill>
         <p:spPr>
           <a:xfrm>
-            <a:off x="10149840" y="959485"/>
-            <a:ext cx="293370" cy="293370"/>
+            <a:off x="10149840" y="914400"/>
+            <a:ext cx="277495" cy="277495"/>
           </a:xfrm>
           <a:prstGeom prst="rect">
             <a:avLst/>
@@ -8326,7 +7896,7 @@
       </p:pic>
       <p:pic>
         <p:nvPicPr>
-          <p:cNvPr id="3" name="Picture 2"/>
+          <p:cNvPr id="17" name="Picture 16"/>
           <p:cNvPicPr>
             <a:picLocks noChangeAspect="1"/>
           </p:cNvPicPr>
@@ -8340,8 +7910,8 @@
         </p:blipFill>
         <p:spPr>
           <a:xfrm>
-            <a:off x="10149840" y="1520190"/>
-            <a:ext cx="293370" cy="293370"/>
+            <a:off x="10154920" y="1295400"/>
+            <a:ext cx="277495" cy="277495"/>
           </a:xfrm>
           <a:prstGeom prst="rect">
             <a:avLst/>
@@ -8350,7 +7920,7 @@
       </p:pic>
       <p:pic>
         <p:nvPicPr>
-          <p:cNvPr id="5" name="Picture 4"/>
+          <p:cNvPr id="18" name="Picture 17"/>
           <p:cNvPicPr>
             <a:picLocks noChangeAspect="1"/>
           </p:cNvPicPr>
@@ -8364,8 +7934,8 @@
         </p:blipFill>
         <p:spPr>
           <a:xfrm>
-            <a:off x="10149840" y="2005965"/>
-            <a:ext cx="293370" cy="293370"/>
+            <a:off x="10149840" y="1692275"/>
+            <a:ext cx="277495" cy="277495"/>
           </a:xfrm>
           <a:prstGeom prst="rect">
             <a:avLst/>
@@ -8374,7 +7944,7 @@
       </p:pic>
       <p:pic>
         <p:nvPicPr>
-          <p:cNvPr id="6" name="Picture 5"/>
+          <p:cNvPr id="19" name="Picture 18"/>
           <p:cNvPicPr>
             <a:picLocks noChangeAspect="1"/>
           </p:cNvPicPr>
@@ -8388,8 +7958,8 @@
         </p:blipFill>
         <p:spPr>
           <a:xfrm>
-            <a:off x="10149840" y="2407920"/>
-            <a:ext cx="293370" cy="293370"/>
+            <a:off x="10154920" y="2073275"/>
+            <a:ext cx="277495" cy="277495"/>
           </a:xfrm>
           <a:prstGeom prst="rect">
             <a:avLst/>
@@ -8398,7 +7968,7 @@
       </p:pic>
       <p:pic>
         <p:nvPicPr>
-          <p:cNvPr id="7" name="Picture 6"/>
+          <p:cNvPr id="20" name="Picture 19"/>
           <p:cNvPicPr>
             <a:picLocks noChangeAspect="1"/>
           </p:cNvPicPr>
@@ -8412,8 +7982,8 @@
         </p:blipFill>
         <p:spPr>
           <a:xfrm>
-            <a:off x="10149840" y="2800350"/>
-            <a:ext cx="293370" cy="293370"/>
+            <a:off x="10154920" y="2506980"/>
+            <a:ext cx="277495" cy="277495"/>
           </a:xfrm>
           <a:prstGeom prst="rect">
             <a:avLst/>
@@ -8422,7 +7992,7 @@
       </p:pic>
       <p:pic>
         <p:nvPicPr>
-          <p:cNvPr id="9" name="Picture 8"/>
+          <p:cNvPr id="21" name="Picture 20"/>
           <p:cNvPicPr>
             <a:picLocks noChangeAspect="1"/>
           </p:cNvPicPr>
@@ -8436,8 +8006,8 @@
         </p:blipFill>
         <p:spPr>
           <a:xfrm>
-            <a:off x="10149840" y="3202940"/>
-            <a:ext cx="293370" cy="293370"/>
+            <a:off x="10160000" y="2887980"/>
+            <a:ext cx="277495" cy="277495"/>
           </a:xfrm>
           <a:prstGeom prst="rect">
             <a:avLst/>
@@ -8446,7 +8016,7 @@
       </p:pic>
       <p:pic>
         <p:nvPicPr>
-          <p:cNvPr id="10" name="Picture 9"/>
+          <p:cNvPr id="22" name="Picture 21"/>
           <p:cNvPicPr>
             <a:picLocks noChangeAspect="1"/>
           </p:cNvPicPr>
@@ -8460,8 +8030,8 @@
         </p:blipFill>
         <p:spPr>
           <a:xfrm>
-            <a:off x="10149840" y="3585210"/>
-            <a:ext cx="293370" cy="293370"/>
+            <a:off x="10154920" y="3284855"/>
+            <a:ext cx="277495" cy="277495"/>
           </a:xfrm>
           <a:prstGeom prst="rect">
             <a:avLst/>
@@ -8470,7 +8040,7 @@
       </p:pic>
       <p:pic>
         <p:nvPicPr>
-          <p:cNvPr id="11" name="Picture 10"/>
+          <p:cNvPr id="23" name="Picture 22"/>
           <p:cNvPicPr>
             <a:picLocks noChangeAspect="1"/>
           </p:cNvPicPr>
@@ -8484,8 +8054,8 @@
         </p:blipFill>
         <p:spPr>
           <a:xfrm>
-            <a:off x="10149840" y="3946525"/>
-            <a:ext cx="293370" cy="293370"/>
+            <a:off x="10160000" y="3767455"/>
+            <a:ext cx="277495" cy="277495"/>
           </a:xfrm>
           <a:prstGeom prst="rect">
             <a:avLst/>
@@ -8494,7 +8064,7 @@
       </p:pic>
       <p:pic>
         <p:nvPicPr>
-          <p:cNvPr id="12" name="Picture 11"/>
+          <p:cNvPr id="25" name="Picture 24"/>
           <p:cNvPicPr>
             <a:picLocks noChangeAspect="1"/>
           </p:cNvPicPr>
@@ -8508,8 +8078,8 @@
         </p:blipFill>
         <p:spPr>
           <a:xfrm>
-            <a:off x="10149840" y="4318000"/>
-            <a:ext cx="293370" cy="293370"/>
+            <a:off x="10149840" y="4365625"/>
+            <a:ext cx="277495" cy="277495"/>
           </a:xfrm>
           <a:prstGeom prst="rect">
             <a:avLst/>
@@ -8518,7 +8088,7 @@
       </p:pic>
       <p:pic>
         <p:nvPicPr>
-          <p:cNvPr id="13" name="Picture 12"/>
+          <p:cNvPr id="26" name="Picture 25"/>
           <p:cNvPicPr>
             <a:picLocks noChangeAspect="1"/>
           </p:cNvPicPr>
@@ -8532,8 +8102,8 @@
         </p:blipFill>
         <p:spPr>
           <a:xfrm>
-            <a:off x="10149840" y="4699635"/>
-            <a:ext cx="293370" cy="293370"/>
+            <a:off x="10154920" y="4746625"/>
+            <a:ext cx="277495" cy="277495"/>
           </a:xfrm>
           <a:prstGeom prst="rect">
             <a:avLst/>
@@ -8542,7 +8112,7 @@
       </p:pic>
       <p:pic>
         <p:nvPicPr>
-          <p:cNvPr id="14" name="Picture 13"/>
+          <p:cNvPr id="27" name="Picture 26"/>
           <p:cNvPicPr>
             <a:picLocks noChangeAspect="1"/>
           </p:cNvPicPr>
@@ -8556,8 +8126,8 @@
         </p:blipFill>
         <p:spPr>
           <a:xfrm>
-            <a:off x="10149840" y="5092065"/>
-            <a:ext cx="293370" cy="293370"/>
+            <a:off x="10149840" y="5143500"/>
+            <a:ext cx="277495" cy="277495"/>
           </a:xfrm>
           <a:prstGeom prst="rect">
             <a:avLst/>
@@ -8566,7 +8136,7 @@
       </p:pic>
       <p:pic>
         <p:nvPicPr>
-          <p:cNvPr id="15" name="Picture 14"/>
+          <p:cNvPr id="28" name="Picture 27"/>
           <p:cNvPicPr>
             <a:picLocks noChangeAspect="1"/>
           </p:cNvPicPr>
@@ -8580,8 +8150,8 @@
         </p:blipFill>
         <p:spPr>
           <a:xfrm>
-            <a:off x="10149840" y="5504815"/>
-            <a:ext cx="293370" cy="293370"/>
+            <a:off x="10154920" y="5524500"/>
+            <a:ext cx="277495" cy="277495"/>
           </a:xfrm>
           <a:prstGeom prst="rect">
             <a:avLst/>
@@ -8597,6 +8167,170 @@
 </p:sld>
 </file>
 
+<file path=ppt/slides/slide14.xml><?xml version="1.0" encoding="utf-8"?>
+<p:sld xmlns:a="http://schemas.openxmlformats.org/drawingml/2006/main" xmlns:r="http://schemas.openxmlformats.org/officeDocument/2006/relationships" xmlns:p="http://schemas.openxmlformats.org/presentationml/2006/main">
+  <p:cSld>
+    <p:spTree>
+      <p:nvGrpSpPr>
+        <p:cNvPr id="1" name=""/>
+        <p:cNvGrpSpPr/>
+        <p:nvPr/>
+      </p:nvGrpSpPr>
+      <p:grpSpPr/>
+      <p:sp>
+        <p:nvSpPr>
+          <p:cNvPr id="2" name="Title 1"/>
+          <p:cNvSpPr>
+            <a:spLocks noGrp="1"/>
+          </p:cNvSpPr>
+          <p:nvPr>
+            <p:ph type="title"/>
+          </p:nvPr>
+        </p:nvSpPr>
+        <p:spPr>
+          <a:xfrm>
+            <a:off x="748665" y="2766060"/>
+            <a:ext cx="10515600" cy="1325563"/>
+          </a:xfrm>
+        </p:spPr>
+        <p:txBody>
+          <a:bodyPr/>
+          <a:p>
+            <a:pPr algn="ctr"/>
+            <a:r>
+              <a:rPr lang="en-US" altLang="en-US" b="1">
+                <a:solidFill>
+                  <a:schemeClr val="tx2">
+                    <a:lumMod val="75000"/>
+                  </a:schemeClr>
+                </a:solidFill>
+              </a:rPr>
+              <a:t>Thank You</a:t>
+            </a:r>
+            <a:endParaRPr lang="en-US" altLang="en-US" b="1">
+              <a:solidFill>
+                <a:schemeClr val="tx2">
+                  <a:lumMod val="75000"/>
+                </a:schemeClr>
+              </a:solidFill>
+            </a:endParaRPr>
+          </a:p>
+        </p:txBody>
+      </p:sp>
+      <p:sp>
+        <p:nvSpPr>
+          <p:cNvPr id="24" name="Rectangle 23"/>
+          <p:cNvSpPr/>
+          <p:nvPr/>
+        </p:nvSpPr>
+        <p:spPr bwMode="auto">
+          <a:xfrm>
+            <a:off x="2771140" y="6458585"/>
+            <a:ext cx="6649085" cy="403860"/>
+          </a:xfrm>
+          <a:prstGeom prst="rect">
+            <a:avLst/>
+          </a:prstGeom>
+          <a:gradFill flip="none" rotWithShape="1">
+            <a:gsLst>
+              <a:gs pos="0">
+                <a:schemeClr val="accent1">
+                  <a:alpha val="80000"/>
+                </a:schemeClr>
+              </a:gs>
+              <a:gs pos="100000">
+                <a:schemeClr val="accent2">
+                  <a:alpha val="80000"/>
+                </a:schemeClr>
+              </a:gs>
+            </a:gsLst>
+            <a:lin ang="5400000" scaled="0"/>
+            <a:tileRect/>
+          </a:gradFill>
+          <a:ln w="9525">
+            <a:noFill/>
+            <a:round/>
+          </a:ln>
+        </p:spPr>
+        <p:txBody>
+          <a:bodyPr vert="horz" wrap="square" lIns="121920" tIns="60960" rIns="121920" bIns="60960" numCol="1" rtlCol="0" anchor="t" anchorCtr="0" compatLnSpc="1"/>
+          <a:p>
+            <a:pPr algn="ctr"/>
+            <a:endParaRPr lang="en-US" sz="2400"/>
+          </a:p>
+        </p:txBody>
+      </p:sp>
+      <p:sp>
+        <p:nvSpPr>
+          <p:cNvPr id="8" name="Rectangle 7"/>
+          <p:cNvSpPr/>
+          <p:nvPr/>
+        </p:nvSpPr>
+        <p:spPr bwMode="auto">
+          <a:xfrm>
+            <a:off x="314325" y="5386070"/>
+            <a:ext cx="434340" cy="1169035"/>
+          </a:xfrm>
+          <a:prstGeom prst="rect">
+            <a:avLst/>
+          </a:prstGeom>
+          <a:solidFill>
+            <a:schemeClr val="tx2"/>
+          </a:solidFill>
+          <a:ln w="9525">
+            <a:noFill/>
+            <a:round/>
+          </a:ln>
+        </p:spPr>
+        <p:txBody>
+          <a:bodyPr vert="horz" wrap="square" lIns="121920" tIns="60960" rIns="121920" bIns="60960" numCol="1" rtlCol="0" anchor="t" anchorCtr="0" compatLnSpc="1"/>
+          <a:p>
+            <a:pPr algn="ctr"/>
+            <a:endParaRPr lang="en-US" sz="2400"/>
+          </a:p>
+        </p:txBody>
+      </p:sp>
+      <p:sp>
+        <p:nvSpPr>
+          <p:cNvPr id="6" name="Rectangle 5"/>
+          <p:cNvSpPr/>
+          <p:nvPr/>
+        </p:nvSpPr>
+        <p:spPr bwMode="auto">
+          <a:xfrm>
+            <a:off x="11454130" y="343535"/>
+            <a:ext cx="412750" cy="706755"/>
+          </a:xfrm>
+          <a:prstGeom prst="rect">
+            <a:avLst/>
+          </a:prstGeom>
+          <a:solidFill>
+            <a:schemeClr val="accent1"/>
+          </a:solidFill>
+          <a:ln w="9525">
+            <a:noFill/>
+            <a:round/>
+          </a:ln>
+        </p:spPr>
+        <p:txBody>
+          <a:bodyPr vert="horz" wrap="square" lIns="121920" tIns="60960" rIns="121920" bIns="60960" numCol="1" rtlCol="0" anchor="t" anchorCtr="0" compatLnSpc="1"/>
+          <a:p>
+            <a:pPr algn="ctr"/>
+            <a:endParaRPr lang="en-US" sz="2400"/>
+          </a:p>
+        </p:txBody>
+      </p:sp>
+    </p:spTree>
+  </p:cSld>
+  <p:clrMapOvr>
+    <a:masterClrMapping/>
+  </p:clrMapOvr>
+  <p:transition>
+    <p:fade thruBlk="1"/>
+  </p:transition>
+</p:sld>
+</file>
+
 <file path=ppt/slides/slide15.xml><?xml version="1.0" encoding="utf-8"?>
 <p:sld xmlns:a="http://schemas.openxmlformats.org/drawingml/2006/main" xmlns:r="http://schemas.openxmlformats.org/officeDocument/2006/relationships" xmlns:p="http://schemas.openxmlformats.org/presentationml/2006/main">
   <p:cSld>
@@ -8628,16 +8362,16 @@
           <a:p>
             <a:pPr algn="ctr"/>
             <a:r>
-              <a:rPr lang="en-US" altLang="en-US" b="1">
+              <a:rPr lang="" altLang="en-US" b="1">
                 <a:solidFill>
                   <a:schemeClr val="tx2">
                     <a:lumMod val="75000"/>
                   </a:schemeClr>
                 </a:solidFill>
               </a:rPr>
-              <a:t>Thank You</a:t>
+              <a:t>Q &amp; A</a:t>
             </a:r>
-            <a:endParaRPr lang="en-US" altLang="en-US" b="1">
+            <a:endParaRPr lang="" altLang="en-US" b="1">
               <a:solidFill>
                 <a:schemeClr val="tx2">
                   <a:lumMod val="75000"/>
@@ -12873,1165 +12607,6 @@
       </p:grpSpPr>
       <p:sp>
         <p:nvSpPr>
-          <p:cNvPr id="4" name="Rectangle 3"/>
-          <p:cNvSpPr/>
-          <p:nvPr/>
-        </p:nvSpPr>
-        <p:spPr>
-          <a:xfrm>
-            <a:off x="5041900" y="2741930"/>
-            <a:ext cx="4366260" cy="247650"/>
-          </a:xfrm>
-          <a:prstGeom prst="rect">
-            <a:avLst/>
-          </a:prstGeom>
-          <a:solidFill>
-            <a:schemeClr val="bg2">
-              <a:lumMod val="90000"/>
-            </a:schemeClr>
-          </a:solidFill>
-          <a:ln>
-            <a:noFill/>
-          </a:ln>
-        </p:spPr>
-        <p:style>
-          <a:lnRef idx="2">
-            <a:schemeClr val="accent1">
-              <a:shade val="50000"/>
-            </a:schemeClr>
-          </a:lnRef>
-          <a:fillRef idx="1">
-            <a:schemeClr val="accent1"/>
-          </a:fillRef>
-          <a:effectRef idx="0">
-            <a:schemeClr val="accent1"/>
-          </a:effectRef>
-          <a:fontRef idx="minor">
-            <a:schemeClr val="lt1"/>
-          </a:fontRef>
-        </p:style>
-        <p:txBody>
-          <a:bodyPr rtlCol="0" anchor="ctr"/>
-          <a:p>
-            <a:pPr algn="ctr"/>
-            <a:endParaRPr lang="en-US"/>
-          </a:p>
-        </p:txBody>
-      </p:sp>
-      <p:sp>
-        <p:nvSpPr>
-          <p:cNvPr id="2" name="Title 1"/>
-          <p:cNvSpPr>
-            <a:spLocks noGrp="1"/>
-          </p:cNvSpPr>
-          <p:nvPr>
-            <p:ph type="title"/>
-          </p:nvPr>
-        </p:nvSpPr>
-        <p:spPr>
-          <a:xfrm>
-            <a:off x="563245" y="407670"/>
-            <a:ext cx="10515600" cy="1325563"/>
-          </a:xfrm>
-        </p:spPr>
-        <p:txBody>
-          <a:bodyPr/>
-          <a:lstStyle/>
-          <a:p>
-            <a:pPr algn="l"/>
-            <a:r>
-              <a:rPr lang="en-US" altLang="en-US" b="1" dirty="0">
-                <a:solidFill>
-                  <a:schemeClr val="accent5">
-                    <a:lumMod val="50000"/>
-                  </a:schemeClr>
-                </a:solidFill>
-                <a:latin typeface="+mn-lt"/>
-                <a:cs typeface="+mn-lt"/>
-              </a:rPr>
-              <a:t>Modular Programming..</a:t>
-            </a:r>
-            <a:endParaRPr lang="en-US" altLang="en-US" b="1" dirty="0">
-              <a:solidFill>
-                <a:schemeClr val="accent5">
-                  <a:lumMod val="50000"/>
-                </a:schemeClr>
-              </a:solidFill>
-              <a:latin typeface="+mn-lt"/>
-              <a:cs typeface="+mn-lt"/>
-            </a:endParaRPr>
-          </a:p>
-        </p:txBody>
-      </p:sp>
-      <p:sp>
-        <p:nvSpPr>
-          <p:cNvPr id="24" name="Rectangle 23"/>
-          <p:cNvSpPr/>
-          <p:nvPr/>
-        </p:nvSpPr>
-        <p:spPr bwMode="auto">
-          <a:xfrm>
-            <a:off x="433705" y="6459220"/>
-            <a:ext cx="11758295" cy="403860"/>
-          </a:xfrm>
-          <a:prstGeom prst="rect">
-            <a:avLst/>
-          </a:prstGeom>
-          <a:gradFill flip="none" rotWithShape="1">
-            <a:gsLst>
-              <a:gs pos="0">
-                <a:schemeClr val="accent1">
-                  <a:alpha val="80000"/>
-                </a:schemeClr>
-              </a:gs>
-              <a:gs pos="100000">
-                <a:schemeClr val="accent2">
-                  <a:alpha val="80000"/>
-                </a:schemeClr>
-              </a:gs>
-            </a:gsLst>
-            <a:lin ang="5400000" scaled="0"/>
-            <a:tileRect/>
-          </a:gradFill>
-          <a:ln w="9525">
-            <a:noFill/>
-            <a:round/>
-          </a:ln>
-        </p:spPr>
-        <p:txBody>
-          <a:bodyPr vert="horz" wrap="square" lIns="121920" tIns="60960" rIns="121920" bIns="60960" numCol="1" rtlCol="0" anchor="t" anchorCtr="0" compatLnSpc="1"/>
-          <a:p>
-            <a:pPr algn="ctr"/>
-            <a:endParaRPr lang="en-US" sz="2400"/>
-          </a:p>
-        </p:txBody>
-      </p:sp>
-      <p:sp>
-        <p:nvSpPr>
-          <p:cNvPr id="8" name="Rectangle 7"/>
-          <p:cNvSpPr/>
-          <p:nvPr/>
-        </p:nvSpPr>
-        <p:spPr bwMode="auto">
-          <a:xfrm>
-            <a:off x="0" y="-327660"/>
-            <a:ext cx="434340" cy="1778000"/>
-          </a:xfrm>
-          <a:prstGeom prst="rect">
-            <a:avLst/>
-          </a:prstGeom>
-          <a:gradFill flip="none" rotWithShape="1">
-            <a:gsLst>
-              <a:gs pos="0">
-                <a:schemeClr val="accent1">
-                  <a:alpha val="80000"/>
-                </a:schemeClr>
-              </a:gs>
-              <a:gs pos="100000">
-                <a:schemeClr val="accent2">
-                  <a:alpha val="80000"/>
-                </a:schemeClr>
-              </a:gs>
-            </a:gsLst>
-            <a:lin ang="5400000" scaled="0"/>
-            <a:tileRect/>
-          </a:gradFill>
-          <a:ln w="9525">
-            <a:noFill/>
-            <a:round/>
-          </a:ln>
-        </p:spPr>
-        <p:txBody>
-          <a:bodyPr vert="horz" wrap="square" lIns="121920" tIns="60960" rIns="121920" bIns="60960" numCol="1" rtlCol="0" anchor="t" anchorCtr="0" compatLnSpc="1"/>
-          <a:p>
-            <a:pPr algn="ctr"/>
-            <a:endParaRPr lang="en-US" sz="2400"/>
-          </a:p>
-        </p:txBody>
-      </p:sp>
-      <p:sp>
-        <p:nvSpPr>
-          <p:cNvPr id="6" name="Content Placeholder 5"/>
-          <p:cNvSpPr>
-            <a:spLocks noGrp="1"/>
-          </p:cNvSpPr>
-          <p:nvPr>
-            <p:ph idx="1"/>
-          </p:nvPr>
-        </p:nvSpPr>
-        <p:spPr>
-          <a:xfrm>
-            <a:off x="782955" y="1583055"/>
-            <a:ext cx="10936605" cy="4876165"/>
-          </a:xfrm>
-        </p:spPr>
-        <p:txBody>
-          <a:bodyPr>
-            <a:normAutofit lnSpcReduction="10000"/>
-          </a:bodyPr>
-          <a:p>
-            <a:pPr algn="l">
-              <a:lnSpc>
-                <a:spcPct val="150000"/>
-              </a:lnSpc>
-            </a:pPr>
-            <a:r>
-              <a:rPr lang="en-US" altLang="en-US" sz="2000" b="1" dirty="0">
-                <a:solidFill>
-                  <a:schemeClr val="accent1">
-                    <a:lumMod val="50000"/>
-                  </a:schemeClr>
-                </a:solidFill>
-                <a:cs typeface="+mn-lt"/>
-              </a:rPr>
-              <a:t>Module based Development approch..</a:t>
-            </a:r>
-            <a:endParaRPr lang="en-US" altLang="en-US" sz="2000" b="1" dirty="0">
-              <a:solidFill>
-                <a:schemeClr val="accent1">
-                  <a:lumMod val="50000"/>
-                </a:schemeClr>
-              </a:solidFill>
-              <a:cs typeface="+mn-lt"/>
-            </a:endParaRPr>
-          </a:p>
-          <a:p>
-            <a:pPr algn="l">
-              <a:lnSpc>
-                <a:spcPct val="150000"/>
-              </a:lnSpc>
-            </a:pPr>
-            <a:r>
-              <a:rPr lang="en-US" altLang="en-US" sz="2000" b="1" dirty="0">
-                <a:solidFill>
-                  <a:schemeClr val="accent1">
-                    <a:lumMod val="50000"/>
-                  </a:schemeClr>
-                </a:solidFill>
-                <a:cs typeface="+mn-lt"/>
-              </a:rPr>
-              <a:t>8 Modules :</a:t>
-            </a:r>
-            <a:endParaRPr lang="en-US" altLang="en-US" sz="2000" b="1" dirty="0">
-              <a:solidFill>
-                <a:schemeClr val="accent1">
-                  <a:lumMod val="50000"/>
-                </a:schemeClr>
-              </a:solidFill>
-              <a:cs typeface="+mn-lt"/>
-            </a:endParaRPr>
-          </a:p>
-          <a:p>
-            <a:pPr lvl="1" algn="l">
-              <a:lnSpc>
-                <a:spcPct val="150000"/>
-              </a:lnSpc>
-            </a:pPr>
-            <a:r>
-              <a:rPr lang="en-US" altLang="en-US" sz="1800" b="1" dirty="0">
-                <a:solidFill>
-                  <a:schemeClr val="accent1">
-                    <a:lumMod val="50000"/>
-                  </a:schemeClr>
-                </a:solidFill>
-                <a:cs typeface="+mn-lt"/>
-              </a:rPr>
-              <a:t>Home &amp; Authentication</a:t>
-            </a:r>
-            <a:endParaRPr lang="en-US" altLang="en-US" sz="1800" b="1" dirty="0">
-              <a:solidFill>
-                <a:schemeClr val="accent1">
-                  <a:lumMod val="50000"/>
-                </a:schemeClr>
-              </a:solidFill>
-              <a:cs typeface="+mn-lt"/>
-            </a:endParaRPr>
-          </a:p>
-          <a:p>
-            <a:pPr lvl="1" algn="l">
-              <a:lnSpc>
-                <a:spcPct val="150000"/>
-              </a:lnSpc>
-            </a:pPr>
-            <a:r>
-              <a:rPr lang="en-US" altLang="en-US" sz="1800" b="1" dirty="0">
-                <a:solidFill>
-                  <a:schemeClr val="accent1">
-                    <a:lumMod val="50000"/>
-                  </a:schemeClr>
-                </a:solidFill>
-                <a:cs typeface="+mn-lt"/>
-              </a:rPr>
-              <a:t>Service</a:t>
-            </a:r>
-            <a:endParaRPr lang="en-US" altLang="en-US" sz="1800" b="1" dirty="0">
-              <a:solidFill>
-                <a:schemeClr val="accent1">
-                  <a:lumMod val="50000"/>
-                </a:schemeClr>
-              </a:solidFill>
-              <a:cs typeface="+mn-lt"/>
-            </a:endParaRPr>
-          </a:p>
-          <a:p>
-            <a:pPr lvl="1" algn="l">
-              <a:lnSpc>
-                <a:spcPct val="150000"/>
-              </a:lnSpc>
-            </a:pPr>
-            <a:r>
-              <a:rPr lang="en-US" altLang="en-US" sz="1800" b="1" dirty="0">
-                <a:solidFill>
-                  <a:schemeClr val="accent1">
-                    <a:lumMod val="50000"/>
-                  </a:schemeClr>
-                </a:solidFill>
-                <a:cs typeface="+mn-lt"/>
-              </a:rPr>
-              <a:t>Product</a:t>
-            </a:r>
-            <a:endParaRPr lang="en-US" altLang="en-US" sz="1800" b="1" dirty="0">
-              <a:solidFill>
-                <a:schemeClr val="accent1">
-                  <a:lumMod val="50000"/>
-                </a:schemeClr>
-              </a:solidFill>
-              <a:cs typeface="+mn-lt"/>
-            </a:endParaRPr>
-          </a:p>
-          <a:p>
-            <a:pPr lvl="1" algn="l">
-              <a:lnSpc>
-                <a:spcPct val="150000"/>
-              </a:lnSpc>
-            </a:pPr>
-            <a:r>
-              <a:rPr lang="en-US" altLang="en-US" sz="1800" b="1" dirty="0">
-                <a:solidFill>
-                  <a:schemeClr val="accent1">
-                    <a:lumMod val="50000"/>
-                  </a:schemeClr>
-                </a:solidFill>
-                <a:cs typeface="+mn-lt"/>
-              </a:rPr>
-              <a:t>ServiceProvider</a:t>
-            </a:r>
-            <a:endParaRPr lang="en-US" altLang="en-US" sz="1800" b="1" dirty="0">
-              <a:solidFill>
-                <a:schemeClr val="accent1">
-                  <a:lumMod val="50000"/>
-                </a:schemeClr>
-              </a:solidFill>
-              <a:cs typeface="+mn-lt"/>
-            </a:endParaRPr>
-          </a:p>
-          <a:p>
-            <a:pPr lvl="1" algn="l">
-              <a:lnSpc>
-                <a:spcPct val="150000"/>
-              </a:lnSpc>
-            </a:pPr>
-            <a:r>
-              <a:rPr lang="en-US" altLang="en-US" sz="1800" b="1" dirty="0">
-                <a:solidFill>
-                  <a:schemeClr val="accent1">
-                    <a:lumMod val="50000"/>
-                  </a:schemeClr>
-                </a:solidFill>
-                <a:cs typeface="+mn-lt"/>
-              </a:rPr>
-              <a:t>Seller</a:t>
-            </a:r>
-            <a:endParaRPr lang="en-US" altLang="en-US" sz="1800" b="1" dirty="0">
-              <a:solidFill>
-                <a:schemeClr val="accent1">
-                  <a:lumMod val="50000"/>
-                </a:schemeClr>
-              </a:solidFill>
-              <a:cs typeface="+mn-lt"/>
-            </a:endParaRPr>
-          </a:p>
-          <a:p>
-            <a:pPr lvl="1" algn="l">
-              <a:lnSpc>
-                <a:spcPct val="150000"/>
-              </a:lnSpc>
-            </a:pPr>
-            <a:r>
-              <a:rPr lang="en-US" altLang="en-US" sz="1800" b="1" dirty="0">
-                <a:solidFill>
-                  <a:schemeClr val="accent1">
-                    <a:lumMod val="50000"/>
-                  </a:schemeClr>
-                </a:solidFill>
-                <a:cs typeface="+mn-lt"/>
-              </a:rPr>
-              <a:t>EventPlanner</a:t>
-            </a:r>
-            <a:endParaRPr lang="en-US" altLang="en-US" sz="1800" b="1" dirty="0">
-              <a:solidFill>
-                <a:schemeClr val="accent1">
-                  <a:lumMod val="50000"/>
-                </a:schemeClr>
-              </a:solidFill>
-              <a:cs typeface="+mn-lt"/>
-            </a:endParaRPr>
-          </a:p>
-          <a:p>
-            <a:pPr lvl="1" algn="l">
-              <a:lnSpc>
-                <a:spcPct val="150000"/>
-              </a:lnSpc>
-            </a:pPr>
-            <a:r>
-              <a:rPr lang="en-US" altLang="en-US" sz="1800" b="1" dirty="0">
-                <a:solidFill>
-                  <a:schemeClr val="accent1">
-                    <a:lumMod val="50000"/>
-                  </a:schemeClr>
-                </a:solidFill>
-                <a:cs typeface="+mn-lt"/>
-              </a:rPr>
-              <a:t>Event</a:t>
-            </a:r>
-            <a:endParaRPr lang="en-US" altLang="en-US" sz="1800" b="1" dirty="0">
-              <a:solidFill>
-                <a:schemeClr val="accent1">
-                  <a:lumMod val="50000"/>
-                </a:schemeClr>
-              </a:solidFill>
-              <a:cs typeface="+mn-lt"/>
-            </a:endParaRPr>
-          </a:p>
-          <a:p>
-            <a:pPr lvl="1" algn="l">
-              <a:lnSpc>
-                <a:spcPct val="150000"/>
-              </a:lnSpc>
-            </a:pPr>
-            <a:r>
-              <a:rPr lang="en-US" altLang="en-US" sz="1800" b="1" dirty="0">
-                <a:solidFill>
-                  <a:schemeClr val="accent1">
-                    <a:lumMod val="50000"/>
-                  </a:schemeClr>
-                </a:solidFill>
-                <a:cs typeface="+mn-lt"/>
-              </a:rPr>
-              <a:t>Administrator</a:t>
-            </a:r>
-            <a:endParaRPr lang="en-US" altLang="en-US" sz="1750" b="1" dirty="0">
-              <a:solidFill>
-                <a:schemeClr val="accent1">
-                  <a:lumMod val="50000"/>
-                </a:schemeClr>
-              </a:solidFill>
-              <a:cs typeface="+mn-lt"/>
-            </a:endParaRPr>
-          </a:p>
-          <a:p>
-            <a:pPr lvl="1" algn="l">
-              <a:lnSpc>
-                <a:spcPct val="150000"/>
-              </a:lnSpc>
-            </a:pPr>
-            <a:endParaRPr lang="en-US" altLang="en-US" sz="1750" b="1" dirty="0">
-              <a:solidFill>
-                <a:schemeClr val="accent1">
-                  <a:lumMod val="50000"/>
-                </a:schemeClr>
-              </a:solidFill>
-              <a:cs typeface="+mn-lt"/>
-            </a:endParaRPr>
-          </a:p>
-          <a:p>
-            <a:pPr lvl="1" algn="l">
-              <a:lnSpc>
-                <a:spcPct val="150000"/>
-              </a:lnSpc>
-            </a:pPr>
-            <a:endParaRPr lang="en-US" altLang="en-US" sz="1750" b="1" dirty="0">
-              <a:solidFill>
-                <a:schemeClr val="accent1">
-                  <a:lumMod val="50000"/>
-                </a:schemeClr>
-              </a:solidFill>
-              <a:cs typeface="+mn-lt"/>
-            </a:endParaRPr>
-          </a:p>
-        </p:txBody>
-      </p:sp>
-      <p:sp>
-        <p:nvSpPr>
-          <p:cNvPr id="3" name="Rectangle 2"/>
-          <p:cNvSpPr/>
-          <p:nvPr/>
-        </p:nvSpPr>
-        <p:spPr>
-          <a:xfrm>
-            <a:off x="5041900" y="2741930"/>
-            <a:ext cx="4303395" cy="247650"/>
-          </a:xfrm>
-          <a:prstGeom prst="rect">
-            <a:avLst/>
-          </a:prstGeom>
-        </p:spPr>
-        <p:style>
-          <a:lnRef idx="2">
-            <a:schemeClr val="accent1">
-              <a:shade val="50000"/>
-            </a:schemeClr>
-          </a:lnRef>
-          <a:fillRef idx="1">
-            <a:schemeClr val="accent1"/>
-          </a:fillRef>
-          <a:effectRef idx="0">
-            <a:schemeClr val="accent1"/>
-          </a:effectRef>
-          <a:fontRef idx="minor">
-            <a:schemeClr val="lt1"/>
-          </a:fontRef>
-        </p:style>
-        <p:txBody>
-          <a:bodyPr rtlCol="0" anchor="ctr"/>
-          <a:p>
-            <a:pPr algn="ctr"/>
-            <a:endParaRPr lang="en-US"/>
-          </a:p>
-        </p:txBody>
-      </p:sp>
-      <p:sp>
-        <p:nvSpPr>
-          <p:cNvPr id="5" name="Rectangle 4"/>
-          <p:cNvSpPr/>
-          <p:nvPr/>
-        </p:nvSpPr>
-        <p:spPr>
-          <a:xfrm>
-            <a:off x="5041900" y="3159125"/>
-            <a:ext cx="4366260" cy="247650"/>
-          </a:xfrm>
-          <a:prstGeom prst="rect">
-            <a:avLst/>
-          </a:prstGeom>
-          <a:solidFill>
-            <a:schemeClr val="bg2">
-              <a:lumMod val="90000"/>
-            </a:schemeClr>
-          </a:solidFill>
-          <a:ln>
-            <a:noFill/>
-          </a:ln>
-        </p:spPr>
-        <p:style>
-          <a:lnRef idx="2">
-            <a:schemeClr val="accent1">
-              <a:shade val="50000"/>
-            </a:schemeClr>
-          </a:lnRef>
-          <a:fillRef idx="1">
-            <a:schemeClr val="accent1"/>
-          </a:fillRef>
-          <a:effectRef idx="0">
-            <a:schemeClr val="accent1"/>
-          </a:effectRef>
-          <a:fontRef idx="minor">
-            <a:schemeClr val="lt1"/>
-          </a:fontRef>
-        </p:style>
-        <p:txBody>
-          <a:bodyPr rtlCol="0" anchor="ctr"/>
-          <a:p>
-            <a:pPr algn="ctr"/>
-            <a:endParaRPr lang="en-US"/>
-          </a:p>
-        </p:txBody>
-      </p:sp>
-      <p:sp>
-        <p:nvSpPr>
-          <p:cNvPr id="7" name="Rectangle 6"/>
-          <p:cNvSpPr/>
-          <p:nvPr/>
-        </p:nvSpPr>
-        <p:spPr>
-          <a:xfrm>
-            <a:off x="5041900" y="3159125"/>
-            <a:ext cx="4065270" cy="247650"/>
-          </a:xfrm>
-          <a:prstGeom prst="rect">
-            <a:avLst/>
-          </a:prstGeom>
-        </p:spPr>
-        <p:style>
-          <a:lnRef idx="2">
-            <a:schemeClr val="accent1">
-              <a:shade val="50000"/>
-            </a:schemeClr>
-          </a:lnRef>
-          <a:fillRef idx="1">
-            <a:schemeClr val="accent1"/>
-          </a:fillRef>
-          <a:effectRef idx="0">
-            <a:schemeClr val="accent1"/>
-          </a:effectRef>
-          <a:fontRef idx="minor">
-            <a:schemeClr val="lt1"/>
-          </a:fontRef>
-        </p:style>
-        <p:txBody>
-          <a:bodyPr rtlCol="0" anchor="ctr"/>
-          <a:p>
-            <a:pPr algn="ctr"/>
-            <a:endParaRPr lang="en-US"/>
-          </a:p>
-        </p:txBody>
-      </p:sp>
-      <p:sp>
-        <p:nvSpPr>
-          <p:cNvPr id="9" name="Rectangle 8"/>
-          <p:cNvSpPr/>
-          <p:nvPr/>
-        </p:nvSpPr>
-        <p:spPr>
-          <a:xfrm>
-            <a:off x="5041900" y="4463415"/>
-            <a:ext cx="4366260" cy="247650"/>
-          </a:xfrm>
-          <a:prstGeom prst="rect">
-            <a:avLst/>
-          </a:prstGeom>
-          <a:solidFill>
-            <a:schemeClr val="bg2">
-              <a:lumMod val="90000"/>
-            </a:schemeClr>
-          </a:solidFill>
-          <a:ln>
-            <a:noFill/>
-          </a:ln>
-        </p:spPr>
-        <p:style>
-          <a:lnRef idx="2">
-            <a:schemeClr val="accent1">
-              <a:shade val="50000"/>
-            </a:schemeClr>
-          </a:lnRef>
-          <a:fillRef idx="1">
-            <a:schemeClr val="accent1"/>
-          </a:fillRef>
-          <a:effectRef idx="0">
-            <a:schemeClr val="accent1"/>
-          </a:effectRef>
-          <a:fontRef idx="minor">
-            <a:schemeClr val="lt1"/>
-          </a:fontRef>
-        </p:style>
-        <p:txBody>
-          <a:bodyPr rtlCol="0" anchor="ctr"/>
-          <a:p>
-            <a:pPr algn="ctr"/>
-            <a:endParaRPr lang="en-US"/>
-          </a:p>
-        </p:txBody>
-      </p:sp>
-      <p:sp>
-        <p:nvSpPr>
-          <p:cNvPr id="10" name="Rectangle 9"/>
-          <p:cNvSpPr/>
-          <p:nvPr/>
-        </p:nvSpPr>
-        <p:spPr>
-          <a:xfrm>
-            <a:off x="5041900" y="4463415"/>
-            <a:ext cx="3725545" cy="247650"/>
-          </a:xfrm>
-          <a:prstGeom prst="rect">
-            <a:avLst/>
-          </a:prstGeom>
-        </p:spPr>
-        <p:style>
-          <a:lnRef idx="2">
-            <a:schemeClr val="accent1">
-              <a:shade val="50000"/>
-            </a:schemeClr>
-          </a:lnRef>
-          <a:fillRef idx="1">
-            <a:schemeClr val="accent1"/>
-          </a:fillRef>
-          <a:effectRef idx="0">
-            <a:schemeClr val="accent1"/>
-          </a:effectRef>
-          <a:fontRef idx="minor">
-            <a:schemeClr val="lt1"/>
-          </a:fontRef>
-        </p:style>
-        <p:txBody>
-          <a:bodyPr rtlCol="0" anchor="ctr"/>
-          <a:p>
-            <a:pPr algn="ctr"/>
-            <a:endParaRPr lang="en-US"/>
-          </a:p>
-        </p:txBody>
-      </p:sp>
-      <p:sp>
-        <p:nvSpPr>
-          <p:cNvPr id="11" name="Rectangle 10"/>
-          <p:cNvSpPr/>
-          <p:nvPr/>
-        </p:nvSpPr>
-        <p:spPr>
-          <a:xfrm>
-            <a:off x="5041900" y="3590925"/>
-            <a:ext cx="4366260" cy="247650"/>
-          </a:xfrm>
-          <a:prstGeom prst="rect">
-            <a:avLst/>
-          </a:prstGeom>
-          <a:solidFill>
-            <a:schemeClr val="bg2">
-              <a:lumMod val="90000"/>
-            </a:schemeClr>
-          </a:solidFill>
-          <a:ln>
-            <a:noFill/>
-          </a:ln>
-        </p:spPr>
-        <p:style>
-          <a:lnRef idx="2">
-            <a:schemeClr val="accent1">
-              <a:shade val="50000"/>
-            </a:schemeClr>
-          </a:lnRef>
-          <a:fillRef idx="1">
-            <a:schemeClr val="accent1"/>
-          </a:fillRef>
-          <a:effectRef idx="0">
-            <a:schemeClr val="accent1"/>
-          </a:effectRef>
-          <a:fontRef idx="minor">
-            <a:schemeClr val="lt1"/>
-          </a:fontRef>
-        </p:style>
-        <p:txBody>
-          <a:bodyPr rtlCol="0" anchor="ctr"/>
-          <a:p>
-            <a:pPr algn="ctr"/>
-            <a:endParaRPr lang="en-US"/>
-          </a:p>
-        </p:txBody>
-      </p:sp>
-      <p:sp>
-        <p:nvSpPr>
-          <p:cNvPr id="12" name="Rectangle 11"/>
-          <p:cNvSpPr/>
-          <p:nvPr/>
-        </p:nvSpPr>
-        <p:spPr>
-          <a:xfrm>
-            <a:off x="5041900" y="3590925"/>
-            <a:ext cx="4065905" cy="247650"/>
-          </a:xfrm>
-          <a:prstGeom prst="rect">
-            <a:avLst/>
-          </a:prstGeom>
-        </p:spPr>
-        <p:style>
-          <a:lnRef idx="2">
-            <a:schemeClr val="accent1">
-              <a:shade val="50000"/>
-            </a:schemeClr>
-          </a:lnRef>
-          <a:fillRef idx="1">
-            <a:schemeClr val="accent1"/>
-          </a:fillRef>
-          <a:effectRef idx="0">
-            <a:schemeClr val="accent1"/>
-          </a:effectRef>
-          <a:fontRef idx="minor">
-            <a:schemeClr val="lt1"/>
-          </a:fontRef>
-        </p:style>
-        <p:txBody>
-          <a:bodyPr rtlCol="0" anchor="ctr"/>
-          <a:p>
-            <a:pPr algn="ctr"/>
-            <a:endParaRPr lang="en-US"/>
-          </a:p>
-        </p:txBody>
-      </p:sp>
-      <p:sp>
-        <p:nvSpPr>
-          <p:cNvPr id="13" name="Rectangle 12"/>
-          <p:cNvSpPr/>
-          <p:nvPr/>
-        </p:nvSpPr>
-        <p:spPr>
-          <a:xfrm>
-            <a:off x="5041900" y="4002405"/>
-            <a:ext cx="4366260" cy="247650"/>
-          </a:xfrm>
-          <a:prstGeom prst="rect">
-            <a:avLst/>
-          </a:prstGeom>
-          <a:solidFill>
-            <a:schemeClr val="bg2">
-              <a:lumMod val="90000"/>
-            </a:schemeClr>
-          </a:solidFill>
-          <a:ln>
-            <a:noFill/>
-          </a:ln>
-        </p:spPr>
-        <p:style>
-          <a:lnRef idx="2">
-            <a:schemeClr val="accent1">
-              <a:shade val="50000"/>
-            </a:schemeClr>
-          </a:lnRef>
-          <a:fillRef idx="1">
-            <a:schemeClr val="accent1"/>
-          </a:fillRef>
-          <a:effectRef idx="0">
-            <a:schemeClr val="accent1"/>
-          </a:effectRef>
-          <a:fontRef idx="minor">
-            <a:schemeClr val="lt1"/>
-          </a:fontRef>
-        </p:style>
-        <p:txBody>
-          <a:bodyPr rtlCol="0" anchor="ctr"/>
-          <a:p>
-            <a:pPr algn="ctr"/>
-            <a:endParaRPr lang="en-US"/>
-          </a:p>
-        </p:txBody>
-      </p:sp>
-      <p:sp>
-        <p:nvSpPr>
-          <p:cNvPr id="14" name="Rectangle 13"/>
-          <p:cNvSpPr/>
-          <p:nvPr/>
-        </p:nvSpPr>
-        <p:spPr>
-          <a:xfrm>
-            <a:off x="5042535" y="4002405"/>
-            <a:ext cx="3725545" cy="247650"/>
-          </a:xfrm>
-          <a:prstGeom prst="rect">
-            <a:avLst/>
-          </a:prstGeom>
-        </p:spPr>
-        <p:style>
-          <a:lnRef idx="2">
-            <a:schemeClr val="accent1">
-              <a:shade val="50000"/>
-            </a:schemeClr>
-          </a:lnRef>
-          <a:fillRef idx="1">
-            <a:schemeClr val="accent1"/>
-          </a:fillRef>
-          <a:effectRef idx="0">
-            <a:schemeClr val="accent1"/>
-          </a:effectRef>
-          <a:fontRef idx="minor">
-            <a:schemeClr val="lt1"/>
-          </a:fontRef>
-        </p:style>
-        <p:txBody>
-          <a:bodyPr rtlCol="0" anchor="ctr"/>
-          <a:p>
-            <a:pPr algn="ctr"/>
-            <a:endParaRPr lang="en-US"/>
-          </a:p>
-        </p:txBody>
-      </p:sp>
-      <p:sp>
-        <p:nvSpPr>
-          <p:cNvPr id="15" name="Rectangle 14"/>
-          <p:cNvSpPr/>
-          <p:nvPr/>
-        </p:nvSpPr>
-        <p:spPr>
-          <a:xfrm>
-            <a:off x="5041265" y="4911090"/>
-            <a:ext cx="4366895" cy="247650"/>
-          </a:xfrm>
-          <a:prstGeom prst="rect">
-            <a:avLst/>
-          </a:prstGeom>
-          <a:solidFill>
-            <a:schemeClr val="bg2">
-              <a:lumMod val="90000"/>
-            </a:schemeClr>
-          </a:solidFill>
-          <a:ln>
-            <a:noFill/>
-          </a:ln>
-        </p:spPr>
-        <p:style>
-          <a:lnRef idx="2">
-            <a:schemeClr val="accent1">
-              <a:shade val="50000"/>
-            </a:schemeClr>
-          </a:lnRef>
-          <a:fillRef idx="1">
-            <a:schemeClr val="accent1"/>
-          </a:fillRef>
-          <a:effectRef idx="0">
-            <a:schemeClr val="accent1"/>
-          </a:effectRef>
-          <a:fontRef idx="minor">
-            <a:schemeClr val="lt1"/>
-          </a:fontRef>
-        </p:style>
-        <p:txBody>
-          <a:bodyPr rtlCol="0" anchor="ctr"/>
-          <a:p>
-            <a:pPr algn="ctr"/>
-            <a:endParaRPr lang="en-US"/>
-          </a:p>
-        </p:txBody>
-      </p:sp>
-      <p:sp>
-        <p:nvSpPr>
-          <p:cNvPr id="16" name="Rectangle 15"/>
-          <p:cNvSpPr/>
-          <p:nvPr/>
-        </p:nvSpPr>
-        <p:spPr>
-          <a:xfrm>
-            <a:off x="5041265" y="4911090"/>
-            <a:ext cx="2322195" cy="247650"/>
-          </a:xfrm>
-          <a:prstGeom prst="rect">
-            <a:avLst/>
-          </a:prstGeom>
-        </p:spPr>
-        <p:style>
-          <a:lnRef idx="2">
-            <a:schemeClr val="accent1">
-              <a:shade val="50000"/>
-            </a:schemeClr>
-          </a:lnRef>
-          <a:fillRef idx="1">
-            <a:schemeClr val="accent1"/>
-          </a:fillRef>
-          <a:effectRef idx="0">
-            <a:schemeClr val="accent1"/>
-          </a:effectRef>
-          <a:fontRef idx="minor">
-            <a:schemeClr val="lt1"/>
-          </a:fontRef>
-        </p:style>
-        <p:txBody>
-          <a:bodyPr rtlCol="0" anchor="ctr"/>
-          <a:p>
-            <a:pPr algn="ctr"/>
-            <a:endParaRPr lang="en-US"/>
-          </a:p>
-        </p:txBody>
-      </p:sp>
-      <p:sp>
-        <p:nvSpPr>
-          <p:cNvPr id="17" name="Rectangle 16"/>
-          <p:cNvSpPr/>
-          <p:nvPr/>
-        </p:nvSpPr>
-        <p:spPr>
-          <a:xfrm>
-            <a:off x="5041900" y="5343525"/>
-            <a:ext cx="4366260" cy="247650"/>
-          </a:xfrm>
-          <a:prstGeom prst="rect">
-            <a:avLst/>
-          </a:prstGeom>
-          <a:solidFill>
-            <a:schemeClr val="bg2">
-              <a:lumMod val="90000"/>
-            </a:schemeClr>
-          </a:solidFill>
-          <a:ln>
-            <a:noFill/>
-          </a:ln>
-        </p:spPr>
-        <p:style>
-          <a:lnRef idx="2">
-            <a:schemeClr val="accent1">
-              <a:shade val="50000"/>
-            </a:schemeClr>
-          </a:lnRef>
-          <a:fillRef idx="1">
-            <a:schemeClr val="accent1"/>
-          </a:fillRef>
-          <a:effectRef idx="0">
-            <a:schemeClr val="accent1"/>
-          </a:effectRef>
-          <a:fontRef idx="minor">
-            <a:schemeClr val="lt1"/>
-          </a:fontRef>
-        </p:style>
-        <p:txBody>
-          <a:bodyPr rtlCol="0" anchor="ctr"/>
-          <a:p>
-            <a:pPr algn="ctr"/>
-            <a:endParaRPr lang="en-US"/>
-          </a:p>
-        </p:txBody>
-      </p:sp>
-      <p:sp>
-        <p:nvSpPr>
-          <p:cNvPr id="18" name="Rectangle 17"/>
-          <p:cNvSpPr/>
-          <p:nvPr/>
-        </p:nvSpPr>
-        <p:spPr>
-          <a:xfrm>
-            <a:off x="5041900" y="5343525"/>
-            <a:ext cx="103505" cy="247650"/>
-          </a:xfrm>
-          <a:prstGeom prst="rect">
-            <a:avLst/>
-          </a:prstGeom>
-        </p:spPr>
-        <p:style>
-          <a:lnRef idx="2">
-            <a:schemeClr val="accent1">
-              <a:shade val="50000"/>
-            </a:schemeClr>
-          </a:lnRef>
-          <a:fillRef idx="1">
-            <a:schemeClr val="accent1"/>
-          </a:fillRef>
-          <a:effectRef idx="0">
-            <a:schemeClr val="accent1"/>
-          </a:effectRef>
-          <a:fontRef idx="minor">
-            <a:schemeClr val="lt1"/>
-          </a:fontRef>
-        </p:style>
-        <p:txBody>
-          <a:bodyPr rtlCol="0" anchor="ctr"/>
-          <a:p>
-            <a:pPr algn="ctr"/>
-            <a:endParaRPr lang="en-US"/>
-          </a:p>
-        </p:txBody>
-      </p:sp>
-      <p:sp>
-        <p:nvSpPr>
-          <p:cNvPr id="19" name="Rectangle 18"/>
-          <p:cNvSpPr/>
-          <p:nvPr/>
-        </p:nvSpPr>
-        <p:spPr>
-          <a:xfrm>
-            <a:off x="5042535" y="5750560"/>
-            <a:ext cx="4366260" cy="247650"/>
-          </a:xfrm>
-          <a:prstGeom prst="rect">
-            <a:avLst/>
-          </a:prstGeom>
-          <a:solidFill>
-            <a:schemeClr val="bg2">
-              <a:lumMod val="90000"/>
-            </a:schemeClr>
-          </a:solidFill>
-          <a:ln>
-            <a:noFill/>
-          </a:ln>
-        </p:spPr>
-        <p:style>
-          <a:lnRef idx="2">
-            <a:schemeClr val="accent1">
-              <a:shade val="50000"/>
-            </a:schemeClr>
-          </a:lnRef>
-          <a:fillRef idx="1">
-            <a:schemeClr val="accent1"/>
-          </a:fillRef>
-          <a:effectRef idx="0">
-            <a:schemeClr val="accent1"/>
-          </a:effectRef>
-          <a:fontRef idx="minor">
-            <a:schemeClr val="lt1"/>
-          </a:fontRef>
-        </p:style>
-        <p:txBody>
-          <a:bodyPr rtlCol="0" anchor="ctr"/>
-          <a:p>
-            <a:pPr algn="ctr"/>
-            <a:endParaRPr lang="en-US"/>
-          </a:p>
-        </p:txBody>
-      </p:sp>
-      <p:sp>
-        <p:nvSpPr>
-          <p:cNvPr id="20" name="Rectangle 19"/>
-          <p:cNvSpPr/>
-          <p:nvPr/>
-        </p:nvSpPr>
-        <p:spPr>
-          <a:xfrm>
-            <a:off x="5042535" y="5750560"/>
-            <a:ext cx="103505" cy="247650"/>
-          </a:xfrm>
-          <a:prstGeom prst="rect">
-            <a:avLst/>
-          </a:prstGeom>
-        </p:spPr>
-        <p:style>
-          <a:lnRef idx="2">
-            <a:schemeClr val="accent1">
-              <a:shade val="50000"/>
-            </a:schemeClr>
-          </a:lnRef>
-          <a:fillRef idx="1">
-            <a:schemeClr val="accent1"/>
-          </a:fillRef>
-          <a:effectRef idx="0">
-            <a:schemeClr val="accent1"/>
-          </a:effectRef>
-          <a:fontRef idx="minor">
-            <a:schemeClr val="lt1"/>
-          </a:fontRef>
-        </p:style>
-        <p:txBody>
-          <a:bodyPr rtlCol="0" anchor="ctr"/>
-          <a:p>
-            <a:pPr algn="ctr"/>
-            <a:endParaRPr lang="en-US"/>
-          </a:p>
-        </p:txBody>
-      </p:sp>
-    </p:spTree>
-  </p:cSld>
-  <p:clrMapOvr>
-    <a:masterClrMapping/>
-  </p:clrMapOvr>
-  <p:transition>
-    <p:fade thruBlk="1"/>
-  </p:transition>
-</p:sld>
-</file>
-
-<file path=ppt/slides/slide7.xml><?xml version="1.0" encoding="utf-8"?>
-<p:sld xmlns:a="http://schemas.openxmlformats.org/drawingml/2006/main" xmlns:r="http://schemas.openxmlformats.org/officeDocument/2006/relationships" xmlns:p="http://schemas.openxmlformats.org/presentationml/2006/main">
-  <p:cSld>
-    <p:spTree>
-      <p:nvGrpSpPr>
-        <p:cNvPr id="1" name=""/>
-        <p:cNvGrpSpPr/>
-        <p:nvPr/>
-      </p:nvGrpSpPr>
-      <p:grpSpPr>
-        <a:xfrm>
-          <a:off x="0" y="0"/>
-          <a:ext cx="0" cy="0"/>
-          <a:chOff x="0" y="0"/>
-          <a:chExt cx="0" cy="0"/>
-        </a:xfrm>
-      </p:grpSpPr>
-      <p:sp>
-        <p:nvSpPr>
           <p:cNvPr id="5" name="Rectangle 4"/>
           <p:cNvSpPr/>
           <p:nvPr/>
@@ -14098,13 +12673,13 @@
         </p:nvSpPr>
         <p:spPr>
           <a:xfrm>
-            <a:off x="2600048" y="2684303"/>
+            <a:off x="2671168" y="2684303"/>
             <a:ext cx="6991904" cy="1325563"/>
           </a:xfrm>
         </p:spPr>
         <p:txBody>
           <a:bodyPr>
-            <a:normAutofit/>
+            <a:normAutofit fontScale="90000"/>
           </a:bodyPr>
           <a:lstStyle/>
           <a:p>
@@ -14117,7 +12692,26 @@
                   </a:schemeClr>
                 </a:solidFill>
               </a:rPr>
-              <a:t>Demonstration</a:t>
+              <a:t>Design Patterns &amp;</a:t>
+            </a:r>
+            <a:br>
+              <a:rPr lang="en-US" altLang="en-US" sz="4800" b="1" dirty="0">
+                <a:solidFill>
+                  <a:schemeClr val="accent2">
+                    <a:lumMod val="50000"/>
+                  </a:schemeClr>
+                </a:solidFill>
+              </a:rPr>
+            </a:br>
+            <a:r>
+              <a:rPr lang="en-US" altLang="en-US" sz="4800" b="1" dirty="0">
+                <a:solidFill>
+                  <a:schemeClr val="accent2">
+                    <a:lumMod val="50000"/>
+                  </a:schemeClr>
+                </a:solidFill>
+              </a:rPr>
+              <a:t>Architectures</a:t>
             </a:r>
             <a:endParaRPr lang="en-US" altLang="en-US" sz="4800" b="1" dirty="0">
               <a:solidFill>
@@ -14237,13 +12831,11 @@
   <p:clrMapOvr>
     <a:masterClrMapping/>
   </p:clrMapOvr>
-  <p:transition>
-    <p:fade thruBlk="1"/>
-  </p:transition>
+  <p:transition/>
 </p:sld>
 </file>
 
-<file path=ppt/slides/slide8.xml><?xml version="1.0" encoding="utf-8"?>
+<file path=ppt/slides/slide7.xml><?xml version="1.0" encoding="utf-8"?>
 <p:sld xmlns:a="http://schemas.openxmlformats.org/drawingml/2006/main" xmlns:r="http://schemas.openxmlformats.org/officeDocument/2006/relationships" xmlns:p="http://schemas.openxmlformats.org/presentationml/2006/main">
   <p:cSld>
     <p:spTree>
@@ -14262,62 +12854,6 @@
       </p:grpSpPr>
       <p:sp>
         <p:nvSpPr>
-          <p:cNvPr id="5" name="Rectangle 4"/>
-          <p:cNvSpPr/>
-          <p:nvPr/>
-        </p:nvSpPr>
-        <p:spPr>
-          <a:xfrm>
-            <a:off x="2978785" y="2203450"/>
-            <a:ext cx="6246495" cy="2281555"/>
-          </a:xfrm>
-          <a:prstGeom prst="rect">
-            <a:avLst/>
-          </a:prstGeom>
-          <a:noFill/>
-          <a:ln w="28575">
-            <a:solidFill>
-              <a:schemeClr val="accent1"/>
-            </a:solidFill>
-          </a:ln>
-          <a:extLst>
-            <a:ext uri="{909E8E84-426E-40DD-AFC4-6F175D3DCCD1}">
-              <a14:hiddenFill xmlns:a14="http://schemas.microsoft.com/office/drawing/2010/main">
-                <a:solidFill>
-                  <a:schemeClr val="bg2">
-                    <a:lumMod val="90000"/>
-                  </a:schemeClr>
-                </a:solidFill>
-              </a14:hiddenFill>
-            </a:ext>
-          </a:extLst>
-        </p:spPr>
-        <p:style>
-          <a:lnRef idx="2">
-            <a:schemeClr val="accent1">
-              <a:shade val="50000"/>
-            </a:schemeClr>
-          </a:lnRef>
-          <a:fillRef idx="1">
-            <a:schemeClr val="accent1"/>
-          </a:fillRef>
-          <a:effectRef idx="0">
-            <a:schemeClr val="accent1"/>
-          </a:effectRef>
-          <a:fontRef idx="minor">
-            <a:schemeClr val="lt1"/>
-          </a:fontRef>
-        </p:style>
-        <p:txBody>
-          <a:bodyPr rtlCol="0" anchor="ctr"/>
-          <a:p>
-            <a:pPr algn="ctr"/>
-            <a:endParaRPr lang="en-US"/>
-          </a:p>
-        </p:txBody>
-      </p:sp>
-      <p:sp>
-        <p:nvSpPr>
           <p:cNvPr id="2" name="Title 1"/>
           <p:cNvSpPr>
             <a:spLocks noGrp="1"/>
@@ -14328,197 +12864,6 @@
         </p:nvSpPr>
         <p:spPr>
           <a:xfrm>
-            <a:off x="2671168" y="2684303"/>
-            <a:ext cx="6991904" cy="1325563"/>
-          </a:xfrm>
-        </p:spPr>
-        <p:txBody>
-          <a:bodyPr>
-            <a:normAutofit fontScale="90000"/>
-          </a:bodyPr>
-          <a:lstStyle/>
-          <a:p>
-            <a:pPr algn="ctr"/>
-            <a:r>
-              <a:rPr lang="en-US" altLang="en-US" sz="4800" b="1" dirty="0">
-                <a:solidFill>
-                  <a:schemeClr val="accent2">
-                    <a:lumMod val="50000"/>
-                  </a:schemeClr>
-                </a:solidFill>
-              </a:rPr>
-              <a:t>Design Patterns &amp;</a:t>
-            </a:r>
-            <a:br>
-              <a:rPr lang="en-US" altLang="en-US" sz="4800" b="1" dirty="0">
-                <a:solidFill>
-                  <a:schemeClr val="accent2">
-                    <a:lumMod val="50000"/>
-                  </a:schemeClr>
-                </a:solidFill>
-              </a:rPr>
-            </a:br>
-            <a:r>
-              <a:rPr lang="en-US" altLang="en-US" sz="4800" b="1" dirty="0">
-                <a:solidFill>
-                  <a:schemeClr val="accent2">
-                    <a:lumMod val="50000"/>
-                  </a:schemeClr>
-                </a:solidFill>
-              </a:rPr>
-              <a:t>Architectures</a:t>
-            </a:r>
-            <a:endParaRPr lang="en-US" altLang="en-US" sz="4800" b="1" dirty="0">
-              <a:solidFill>
-                <a:schemeClr val="accent2">
-                  <a:lumMod val="50000"/>
-                </a:schemeClr>
-              </a:solidFill>
-            </a:endParaRPr>
-          </a:p>
-        </p:txBody>
-      </p:sp>
-      <p:sp>
-        <p:nvSpPr>
-          <p:cNvPr id="24" name="Rectangle 23"/>
-          <p:cNvSpPr/>
-          <p:nvPr/>
-        </p:nvSpPr>
-        <p:spPr bwMode="auto">
-          <a:xfrm>
-            <a:off x="2771140" y="6458585"/>
-            <a:ext cx="6649085" cy="403860"/>
-          </a:xfrm>
-          <a:prstGeom prst="rect">
-            <a:avLst/>
-          </a:prstGeom>
-          <a:gradFill flip="none" rotWithShape="1">
-            <a:gsLst>
-              <a:gs pos="0">
-                <a:schemeClr val="accent1">
-                  <a:alpha val="80000"/>
-                </a:schemeClr>
-              </a:gs>
-              <a:gs pos="100000">
-                <a:schemeClr val="accent2">
-                  <a:alpha val="80000"/>
-                </a:schemeClr>
-              </a:gs>
-            </a:gsLst>
-            <a:lin ang="5400000" scaled="0"/>
-            <a:tileRect/>
-          </a:gradFill>
-          <a:ln w="9525">
-            <a:noFill/>
-            <a:round/>
-          </a:ln>
-        </p:spPr>
-        <p:txBody>
-          <a:bodyPr vert="horz" wrap="square" lIns="121920" tIns="60960" rIns="121920" bIns="60960" numCol="1" rtlCol="0" anchor="t" anchorCtr="0" compatLnSpc="1"/>
-          <a:p>
-            <a:pPr algn="ctr"/>
-            <a:endParaRPr lang="en-US" sz="2400"/>
-          </a:p>
-        </p:txBody>
-      </p:sp>
-      <p:sp>
-        <p:nvSpPr>
-          <p:cNvPr id="8" name="Rectangle 7"/>
-          <p:cNvSpPr/>
-          <p:nvPr/>
-        </p:nvSpPr>
-        <p:spPr bwMode="auto">
-          <a:xfrm>
-            <a:off x="2771140" y="1923415"/>
-            <a:ext cx="434340" cy="1169035"/>
-          </a:xfrm>
-          <a:prstGeom prst="rect">
-            <a:avLst/>
-          </a:prstGeom>
-          <a:solidFill>
-            <a:schemeClr val="tx2"/>
-          </a:solidFill>
-          <a:ln w="9525">
-            <a:noFill/>
-            <a:round/>
-          </a:ln>
-        </p:spPr>
-        <p:txBody>
-          <a:bodyPr vert="horz" wrap="square" lIns="121920" tIns="60960" rIns="121920" bIns="60960" numCol="1" rtlCol="0" anchor="t" anchorCtr="0" compatLnSpc="1"/>
-          <a:p>
-            <a:pPr algn="ctr"/>
-            <a:endParaRPr lang="en-US" sz="2400"/>
-          </a:p>
-        </p:txBody>
-      </p:sp>
-      <p:sp>
-        <p:nvSpPr>
-          <p:cNvPr id="4" name="Rectangle 3"/>
-          <p:cNvSpPr/>
-          <p:nvPr/>
-        </p:nvSpPr>
-        <p:spPr bwMode="auto">
-          <a:xfrm>
-            <a:off x="9007475" y="4010025"/>
-            <a:ext cx="412750" cy="706755"/>
-          </a:xfrm>
-          <a:prstGeom prst="rect">
-            <a:avLst/>
-          </a:prstGeom>
-          <a:solidFill>
-            <a:schemeClr val="tx2"/>
-          </a:solidFill>
-          <a:ln w="9525">
-            <a:noFill/>
-            <a:round/>
-          </a:ln>
-        </p:spPr>
-        <p:txBody>
-          <a:bodyPr vert="horz" wrap="square" lIns="121920" tIns="60960" rIns="121920" bIns="60960" numCol="1" rtlCol="0" anchor="t" anchorCtr="0" compatLnSpc="1"/>
-          <a:p>
-            <a:pPr algn="ctr"/>
-            <a:endParaRPr lang="en-US" sz="2400"/>
-          </a:p>
-        </p:txBody>
-      </p:sp>
-    </p:spTree>
-  </p:cSld>
-  <p:clrMapOvr>
-    <a:masterClrMapping/>
-  </p:clrMapOvr>
-  <p:transition/>
-</p:sld>
-</file>
-
-<file path=ppt/slides/slide9.xml><?xml version="1.0" encoding="utf-8"?>
-<p:sld xmlns:a="http://schemas.openxmlformats.org/drawingml/2006/main" xmlns:r="http://schemas.openxmlformats.org/officeDocument/2006/relationships" xmlns:p="http://schemas.openxmlformats.org/presentationml/2006/main">
-  <p:cSld>
-    <p:spTree>
-      <p:nvGrpSpPr>
-        <p:cNvPr id="1" name=""/>
-        <p:cNvGrpSpPr/>
-        <p:nvPr/>
-      </p:nvGrpSpPr>
-      <p:grpSpPr>
-        <a:xfrm>
-          <a:off x="0" y="0"/>
-          <a:ext cx="0" cy="0"/>
-          <a:chOff x="0" y="0"/>
-          <a:chExt cx="0" cy="0"/>
-        </a:xfrm>
-      </p:grpSpPr>
-      <p:sp>
-        <p:nvSpPr>
-          <p:cNvPr id="2" name="Title 1"/>
-          <p:cNvSpPr>
-            <a:spLocks noGrp="1"/>
-          </p:cNvSpPr>
-          <p:nvPr>
-            <p:ph type="title"/>
-          </p:nvPr>
-        </p:nvSpPr>
-        <p:spPr>
-          <a:xfrm>
             <a:off x="563245" y="407670"/>
             <a:ext cx="10515600" cy="1325563"/>
           </a:xfrm>
@@ -14529,7 +12874,7 @@
           <a:p>
             <a:pPr algn="l"/>
             <a:r>
-              <a:rPr lang="" altLang="en-US" b="1" dirty="0">
+              <a:rPr lang="en-US" altLang="en-US" b="1" dirty="0">
                 <a:solidFill>
                   <a:schemeClr val="accent5">
                     <a:lumMod val="50000"/>
@@ -14538,19 +12883,7 @@
                 <a:latin typeface="+mn-lt"/>
                 <a:cs typeface="+mn-lt"/>
               </a:rPr>
-              <a:t>Design Patterns</a:t>
-            </a:r>
-            <a:r>
-              <a:rPr lang="en-US" altLang="en-US" b="1" dirty="0">
-                <a:solidFill>
-                  <a:schemeClr val="accent5">
-                    <a:lumMod val="50000"/>
-                  </a:schemeClr>
-                </a:solidFill>
-                <a:latin typeface="+mn-lt"/>
-                <a:cs typeface="+mn-lt"/>
-              </a:rPr>
-              <a:t>..</a:t>
+              <a:t>Design Patterns..</a:t>
             </a:r>
             <a:endParaRPr lang="en-US" altLang="en-US" b="1" dirty="0">
               <a:solidFill>
@@ -15115,6 +13448,692 @@
           </a:prstGeom>
         </p:spPr>
       </p:pic>
+    </p:spTree>
+  </p:cSld>
+  <p:clrMapOvr>
+    <a:masterClrMapping/>
+  </p:clrMapOvr>
+  <p:transition/>
+</p:sld>
+</file>
+
+<file path=ppt/slides/slide8.xml><?xml version="1.0" encoding="utf-8"?>
+<p:sld xmlns:a="http://schemas.openxmlformats.org/drawingml/2006/main" xmlns:r="http://schemas.openxmlformats.org/officeDocument/2006/relationships" xmlns:p="http://schemas.openxmlformats.org/presentationml/2006/main">
+  <p:cSld>
+    <p:spTree>
+      <p:nvGrpSpPr>
+        <p:cNvPr id="1" name=""/>
+        <p:cNvGrpSpPr/>
+        <p:nvPr/>
+      </p:nvGrpSpPr>
+      <p:grpSpPr>
+        <a:xfrm>
+          <a:off x="0" y="0"/>
+          <a:ext cx="0" cy="0"/>
+          <a:chOff x="0" y="0"/>
+          <a:chExt cx="0" cy="0"/>
+        </a:xfrm>
+      </p:grpSpPr>
+      <p:sp>
+        <p:nvSpPr>
+          <p:cNvPr id="5" name="Rectangle 4"/>
+          <p:cNvSpPr/>
+          <p:nvPr/>
+        </p:nvSpPr>
+        <p:spPr>
+          <a:xfrm>
+            <a:off x="2978785" y="2203450"/>
+            <a:ext cx="6246495" cy="2281555"/>
+          </a:xfrm>
+          <a:prstGeom prst="rect">
+            <a:avLst/>
+          </a:prstGeom>
+          <a:noFill/>
+          <a:ln w="28575">
+            <a:solidFill>
+              <a:schemeClr val="accent1"/>
+            </a:solidFill>
+          </a:ln>
+          <a:extLst>
+            <a:ext uri="{909E8E84-426E-40DD-AFC4-6F175D3DCCD1}">
+              <a14:hiddenFill xmlns:a14="http://schemas.microsoft.com/office/drawing/2010/main">
+                <a:solidFill>
+                  <a:schemeClr val="bg2">
+                    <a:lumMod val="90000"/>
+                  </a:schemeClr>
+                </a:solidFill>
+              </a14:hiddenFill>
+            </a:ext>
+          </a:extLst>
+        </p:spPr>
+        <p:style>
+          <a:lnRef idx="2">
+            <a:schemeClr val="accent1">
+              <a:shade val="50000"/>
+            </a:schemeClr>
+          </a:lnRef>
+          <a:fillRef idx="1">
+            <a:schemeClr val="accent1"/>
+          </a:fillRef>
+          <a:effectRef idx="0">
+            <a:schemeClr val="accent1"/>
+          </a:effectRef>
+          <a:fontRef idx="minor">
+            <a:schemeClr val="lt1"/>
+          </a:fontRef>
+        </p:style>
+        <p:txBody>
+          <a:bodyPr rtlCol="0" anchor="ctr"/>
+          <a:p>
+            <a:pPr algn="ctr"/>
+            <a:endParaRPr lang="en-US"/>
+          </a:p>
+        </p:txBody>
+      </p:sp>
+      <p:sp>
+        <p:nvSpPr>
+          <p:cNvPr id="2" name="Title 1"/>
+          <p:cNvSpPr>
+            <a:spLocks noGrp="1"/>
+          </p:cNvSpPr>
+          <p:nvPr>
+            <p:ph type="title"/>
+          </p:nvPr>
+        </p:nvSpPr>
+        <p:spPr>
+          <a:xfrm>
+            <a:off x="2600048" y="2684303"/>
+            <a:ext cx="6991904" cy="1325563"/>
+          </a:xfrm>
+        </p:spPr>
+        <p:txBody>
+          <a:bodyPr>
+            <a:normAutofit fontScale="90000"/>
+          </a:bodyPr>
+          <a:lstStyle/>
+          <a:p>
+            <a:pPr algn="ctr"/>
+            <a:r>
+              <a:rPr lang="en-US" altLang="en-US" sz="4800" b="1" dirty="0">
+                <a:solidFill>
+                  <a:schemeClr val="accent2">
+                    <a:lumMod val="50000"/>
+                  </a:schemeClr>
+                </a:solidFill>
+              </a:rPr>
+              <a:t>Other Libraries &amp;</a:t>
+            </a:r>
+            <a:br>
+              <a:rPr lang="en-US" altLang="en-US" sz="4800" b="1" dirty="0">
+                <a:solidFill>
+                  <a:schemeClr val="accent2">
+                    <a:lumMod val="50000"/>
+                  </a:schemeClr>
+                </a:solidFill>
+              </a:rPr>
+            </a:br>
+            <a:r>
+              <a:rPr lang="en-US" altLang="en-US" sz="4800" b="1" dirty="0">
+                <a:solidFill>
+                  <a:schemeClr val="accent2">
+                    <a:lumMod val="50000"/>
+                  </a:schemeClr>
+                </a:solidFill>
+              </a:rPr>
+              <a:t>Frameworks</a:t>
+            </a:r>
+            <a:endParaRPr lang="en-US" altLang="en-US" sz="4800" b="1" dirty="0">
+              <a:solidFill>
+                <a:schemeClr val="accent2">
+                  <a:lumMod val="50000"/>
+                </a:schemeClr>
+              </a:solidFill>
+            </a:endParaRPr>
+          </a:p>
+        </p:txBody>
+      </p:sp>
+      <p:sp>
+        <p:nvSpPr>
+          <p:cNvPr id="24" name="Rectangle 23"/>
+          <p:cNvSpPr/>
+          <p:nvPr/>
+        </p:nvSpPr>
+        <p:spPr bwMode="auto">
+          <a:xfrm>
+            <a:off x="2771140" y="6458585"/>
+            <a:ext cx="6649085" cy="403860"/>
+          </a:xfrm>
+          <a:prstGeom prst="rect">
+            <a:avLst/>
+          </a:prstGeom>
+          <a:gradFill flip="none" rotWithShape="1">
+            <a:gsLst>
+              <a:gs pos="0">
+                <a:schemeClr val="accent1">
+                  <a:alpha val="80000"/>
+                </a:schemeClr>
+              </a:gs>
+              <a:gs pos="100000">
+                <a:schemeClr val="accent2">
+                  <a:alpha val="80000"/>
+                </a:schemeClr>
+              </a:gs>
+            </a:gsLst>
+            <a:lin ang="5400000" scaled="0"/>
+            <a:tileRect/>
+          </a:gradFill>
+          <a:ln w="9525">
+            <a:noFill/>
+            <a:round/>
+          </a:ln>
+        </p:spPr>
+        <p:txBody>
+          <a:bodyPr vert="horz" wrap="square" lIns="121920" tIns="60960" rIns="121920" bIns="60960" numCol="1" rtlCol="0" anchor="t" anchorCtr="0" compatLnSpc="1"/>
+          <a:p>
+            <a:pPr algn="ctr"/>
+            <a:endParaRPr lang="en-US" sz="2400"/>
+          </a:p>
+        </p:txBody>
+      </p:sp>
+      <p:sp>
+        <p:nvSpPr>
+          <p:cNvPr id="8" name="Rectangle 7"/>
+          <p:cNvSpPr/>
+          <p:nvPr/>
+        </p:nvSpPr>
+        <p:spPr bwMode="auto">
+          <a:xfrm>
+            <a:off x="2771140" y="1923415"/>
+            <a:ext cx="434340" cy="1169035"/>
+          </a:xfrm>
+          <a:prstGeom prst="rect">
+            <a:avLst/>
+          </a:prstGeom>
+          <a:solidFill>
+            <a:schemeClr val="tx2"/>
+          </a:solidFill>
+          <a:ln w="9525">
+            <a:noFill/>
+            <a:round/>
+          </a:ln>
+        </p:spPr>
+        <p:txBody>
+          <a:bodyPr vert="horz" wrap="square" lIns="121920" tIns="60960" rIns="121920" bIns="60960" numCol="1" rtlCol="0" anchor="t" anchorCtr="0" compatLnSpc="1"/>
+          <a:p>
+            <a:pPr algn="ctr"/>
+            <a:endParaRPr lang="en-US" sz="2400"/>
+          </a:p>
+        </p:txBody>
+      </p:sp>
+      <p:sp>
+        <p:nvSpPr>
+          <p:cNvPr id="4" name="Rectangle 3"/>
+          <p:cNvSpPr/>
+          <p:nvPr/>
+        </p:nvSpPr>
+        <p:spPr bwMode="auto">
+          <a:xfrm>
+            <a:off x="9007475" y="4010025"/>
+            <a:ext cx="412750" cy="706755"/>
+          </a:xfrm>
+          <a:prstGeom prst="rect">
+            <a:avLst/>
+          </a:prstGeom>
+          <a:solidFill>
+            <a:schemeClr val="tx2"/>
+          </a:solidFill>
+          <a:ln w="9525">
+            <a:noFill/>
+            <a:round/>
+          </a:ln>
+        </p:spPr>
+        <p:txBody>
+          <a:bodyPr vert="horz" wrap="square" lIns="121920" tIns="60960" rIns="121920" bIns="60960" numCol="1" rtlCol="0" anchor="t" anchorCtr="0" compatLnSpc="1"/>
+          <a:p>
+            <a:pPr algn="ctr"/>
+            <a:endParaRPr lang="en-US" sz="2400"/>
+          </a:p>
+        </p:txBody>
+      </p:sp>
+    </p:spTree>
+  </p:cSld>
+  <p:clrMapOvr>
+    <a:masterClrMapping/>
+  </p:clrMapOvr>
+  <p:transition/>
+</p:sld>
+</file>
+
+<file path=ppt/slides/slide9.xml><?xml version="1.0" encoding="utf-8"?>
+<p:sld xmlns:a="http://schemas.openxmlformats.org/drawingml/2006/main" xmlns:r="http://schemas.openxmlformats.org/officeDocument/2006/relationships" xmlns:p="http://schemas.openxmlformats.org/presentationml/2006/main">
+  <p:cSld>
+    <p:spTree>
+      <p:nvGrpSpPr>
+        <p:cNvPr id="1" name=""/>
+        <p:cNvGrpSpPr/>
+        <p:nvPr/>
+      </p:nvGrpSpPr>
+      <p:grpSpPr>
+        <a:xfrm>
+          <a:off x="0" y="0"/>
+          <a:ext cx="0" cy="0"/>
+          <a:chOff x="0" y="0"/>
+          <a:chExt cx="0" cy="0"/>
+        </a:xfrm>
+      </p:grpSpPr>
+      <p:sp>
+        <p:nvSpPr>
+          <p:cNvPr id="2" name="Title 1"/>
+          <p:cNvSpPr>
+            <a:spLocks noGrp="1"/>
+          </p:cNvSpPr>
+          <p:nvPr>
+            <p:ph type="title"/>
+          </p:nvPr>
+        </p:nvSpPr>
+        <p:spPr>
+          <a:xfrm>
+            <a:off x="563245" y="407670"/>
+            <a:ext cx="10515600" cy="1325563"/>
+          </a:xfrm>
+        </p:spPr>
+        <p:txBody>
+          <a:bodyPr/>
+          <a:lstStyle/>
+          <a:p>
+            <a:pPr algn="l"/>
+            <a:r>
+              <a:rPr lang="en-US" altLang="en-US" b="1" dirty="0">
+                <a:solidFill>
+                  <a:schemeClr val="accent5">
+                    <a:lumMod val="50000"/>
+                  </a:schemeClr>
+                </a:solidFill>
+                <a:latin typeface="+mn-lt"/>
+                <a:cs typeface="+mn-lt"/>
+              </a:rPr>
+              <a:t>Libraries/ Frameworks used..</a:t>
+            </a:r>
+            <a:endParaRPr lang="en-US" altLang="en-US" b="1" dirty="0">
+              <a:solidFill>
+                <a:schemeClr val="accent5">
+                  <a:lumMod val="50000"/>
+                </a:schemeClr>
+              </a:solidFill>
+              <a:latin typeface="+mn-lt"/>
+              <a:cs typeface="+mn-lt"/>
+            </a:endParaRPr>
+          </a:p>
+        </p:txBody>
+      </p:sp>
+      <p:sp>
+        <p:nvSpPr>
+          <p:cNvPr id="24" name="Rectangle 23"/>
+          <p:cNvSpPr/>
+          <p:nvPr/>
+        </p:nvSpPr>
+        <p:spPr bwMode="auto">
+          <a:xfrm>
+            <a:off x="433705" y="6459220"/>
+            <a:ext cx="11758295" cy="403860"/>
+          </a:xfrm>
+          <a:prstGeom prst="rect">
+            <a:avLst/>
+          </a:prstGeom>
+          <a:gradFill flip="none" rotWithShape="1">
+            <a:gsLst>
+              <a:gs pos="0">
+                <a:schemeClr val="accent1">
+                  <a:alpha val="80000"/>
+                </a:schemeClr>
+              </a:gs>
+              <a:gs pos="100000">
+                <a:schemeClr val="accent2">
+                  <a:alpha val="80000"/>
+                </a:schemeClr>
+              </a:gs>
+            </a:gsLst>
+            <a:lin ang="5400000" scaled="0"/>
+            <a:tileRect/>
+          </a:gradFill>
+          <a:ln w="9525">
+            <a:noFill/>
+            <a:round/>
+          </a:ln>
+        </p:spPr>
+        <p:txBody>
+          <a:bodyPr vert="horz" wrap="square" lIns="121920" tIns="60960" rIns="121920" bIns="60960" numCol="1" rtlCol="0" anchor="t" anchorCtr="0" compatLnSpc="1"/>
+          <a:p>
+            <a:pPr algn="ctr"/>
+            <a:endParaRPr lang="en-US" sz="2400"/>
+          </a:p>
+        </p:txBody>
+      </p:sp>
+      <p:sp>
+        <p:nvSpPr>
+          <p:cNvPr id="8" name="Rectangle 7"/>
+          <p:cNvSpPr/>
+          <p:nvPr/>
+        </p:nvSpPr>
+        <p:spPr bwMode="auto">
+          <a:xfrm>
+            <a:off x="0" y="-327660"/>
+            <a:ext cx="434340" cy="1778000"/>
+          </a:xfrm>
+          <a:prstGeom prst="rect">
+            <a:avLst/>
+          </a:prstGeom>
+          <a:gradFill flip="none" rotWithShape="1">
+            <a:gsLst>
+              <a:gs pos="0">
+                <a:schemeClr val="accent1">
+                  <a:alpha val="80000"/>
+                </a:schemeClr>
+              </a:gs>
+              <a:gs pos="100000">
+                <a:schemeClr val="accent2">
+                  <a:alpha val="80000"/>
+                </a:schemeClr>
+              </a:gs>
+            </a:gsLst>
+            <a:lin ang="5400000" scaled="0"/>
+            <a:tileRect/>
+          </a:gradFill>
+          <a:ln w="9525">
+            <a:noFill/>
+            <a:round/>
+          </a:ln>
+        </p:spPr>
+        <p:txBody>
+          <a:bodyPr vert="horz" wrap="square" lIns="121920" tIns="60960" rIns="121920" bIns="60960" numCol="1" rtlCol="0" anchor="t" anchorCtr="0" compatLnSpc="1"/>
+          <a:p>
+            <a:pPr algn="ctr"/>
+            <a:endParaRPr lang="en-US" sz="2400"/>
+          </a:p>
+        </p:txBody>
+      </p:sp>
+      <p:sp>
+        <p:nvSpPr>
+          <p:cNvPr id="6" name="Content Placeholder 5"/>
+          <p:cNvSpPr>
+            <a:spLocks noGrp="1"/>
+          </p:cNvSpPr>
+          <p:nvPr>
+            <p:ph idx="1"/>
+          </p:nvPr>
+        </p:nvSpPr>
+        <p:spPr>
+          <a:xfrm>
+            <a:off x="823595" y="1665605"/>
+            <a:ext cx="10544175" cy="4394835"/>
+          </a:xfrm>
+        </p:spPr>
+        <p:txBody>
+          <a:bodyPr>
+            <a:normAutofit fontScale="90000" lnSpcReduction="20000"/>
+          </a:bodyPr>
+          <a:p>
+            <a:pPr algn="l">
+              <a:lnSpc>
+                <a:spcPct val="150000"/>
+              </a:lnSpc>
+            </a:pPr>
+            <a:r>
+              <a:rPr lang="en-US" altLang="en-US" sz="2000" b="1" dirty="0">
+                <a:solidFill>
+                  <a:schemeClr val="accent1">
+                    <a:lumMod val="50000"/>
+                  </a:schemeClr>
+                </a:solidFill>
+                <a:cs typeface="+mn-lt"/>
+              </a:rPr>
+              <a:t>Angular Material - UI Library</a:t>
+            </a:r>
+            <a:endParaRPr lang="en-US" altLang="en-US" sz="2000" b="1" dirty="0">
+              <a:solidFill>
+                <a:schemeClr val="accent1">
+                  <a:lumMod val="50000"/>
+                </a:schemeClr>
+              </a:solidFill>
+              <a:cs typeface="+mn-lt"/>
+            </a:endParaRPr>
+          </a:p>
+          <a:p>
+            <a:pPr algn="l">
+              <a:lnSpc>
+                <a:spcPct val="150000"/>
+              </a:lnSpc>
+            </a:pPr>
+            <a:r>
+              <a:rPr lang="en-US" altLang="en-US" sz="2000" b="1" dirty="0">
+                <a:solidFill>
+                  <a:schemeClr val="accent1">
+                    <a:lumMod val="50000"/>
+                  </a:schemeClr>
+                </a:solidFill>
+                <a:cs typeface="+mn-lt"/>
+              </a:rPr>
+              <a:t>Multer - Image uploading &amp; handeling</a:t>
+            </a:r>
+            <a:endParaRPr lang="en-US" altLang="en-US" sz="2000" b="1" dirty="0">
+              <a:solidFill>
+                <a:schemeClr val="accent1">
+                  <a:lumMod val="50000"/>
+                </a:schemeClr>
+              </a:solidFill>
+              <a:cs typeface="+mn-lt"/>
+            </a:endParaRPr>
+          </a:p>
+          <a:p>
+            <a:pPr algn="l">
+              <a:lnSpc>
+                <a:spcPct val="150000"/>
+              </a:lnSpc>
+            </a:pPr>
+            <a:r>
+              <a:rPr lang="en-US" altLang="en-US" sz="2000" b="1" dirty="0">
+                <a:solidFill>
+                  <a:schemeClr val="accent1">
+                    <a:lumMod val="50000"/>
+                  </a:schemeClr>
+                </a:solidFill>
+                <a:cs typeface="+mn-lt"/>
+              </a:rPr>
+              <a:t>Body Parser - JSON object Parsing</a:t>
+            </a:r>
+            <a:endParaRPr lang="en-US" altLang="en-US" sz="2000" b="1" dirty="0">
+              <a:solidFill>
+                <a:schemeClr val="accent1">
+                  <a:lumMod val="50000"/>
+                </a:schemeClr>
+              </a:solidFill>
+              <a:cs typeface="+mn-lt"/>
+            </a:endParaRPr>
+          </a:p>
+          <a:p>
+            <a:pPr algn="l">
+              <a:lnSpc>
+                <a:spcPct val="150000"/>
+              </a:lnSpc>
+            </a:pPr>
+            <a:r>
+              <a:rPr lang="en-US" altLang="en-US" sz="2000" b="1" dirty="0">
+                <a:solidFill>
+                  <a:schemeClr val="accent1">
+                    <a:lumMod val="50000"/>
+                  </a:schemeClr>
+                </a:solidFill>
+                <a:cs typeface="+mn-lt"/>
+              </a:rPr>
+              <a:t>Mongoose - Secure MongoDB database controller</a:t>
+            </a:r>
+            <a:endParaRPr lang="en-US" altLang="en-US" sz="2000" b="1" dirty="0">
+              <a:solidFill>
+                <a:schemeClr val="accent1">
+                  <a:lumMod val="50000"/>
+                </a:schemeClr>
+              </a:solidFill>
+              <a:cs typeface="+mn-lt"/>
+            </a:endParaRPr>
+          </a:p>
+          <a:p>
+            <a:pPr algn="l">
+              <a:lnSpc>
+                <a:spcPct val="150000"/>
+              </a:lnSpc>
+            </a:pPr>
+            <a:r>
+              <a:rPr lang="en-US" altLang="en-US" sz="2000" b="1" dirty="0">
+                <a:solidFill>
+                  <a:schemeClr val="accent1">
+                    <a:lumMod val="50000"/>
+                  </a:schemeClr>
+                </a:solidFill>
+                <a:cs typeface="+mn-lt"/>
+              </a:rPr>
+              <a:t>JSON Web Tokens - Secure Authentication &amp; Authorization</a:t>
+            </a:r>
+            <a:endParaRPr lang="en-US" altLang="en-US" sz="2000" b="1" dirty="0">
+              <a:solidFill>
+                <a:schemeClr val="accent1">
+                  <a:lumMod val="50000"/>
+                </a:schemeClr>
+              </a:solidFill>
+              <a:cs typeface="+mn-lt"/>
+            </a:endParaRPr>
+          </a:p>
+          <a:p>
+            <a:pPr algn="l">
+              <a:lnSpc>
+                <a:spcPct val="150000"/>
+              </a:lnSpc>
+            </a:pPr>
+            <a:r>
+              <a:rPr lang="en-US" altLang="en-US" sz="2000" b="1" dirty="0">
+                <a:solidFill>
+                  <a:schemeClr val="accent1">
+                    <a:lumMod val="50000"/>
+                  </a:schemeClr>
+                </a:solidFill>
+                <a:cs typeface="+mn-lt"/>
+              </a:rPr>
+              <a:t>Nodemailer - Email message handeling</a:t>
+            </a:r>
+            <a:endParaRPr lang="en-US" altLang="en-US" sz="2000" b="1" dirty="0">
+              <a:solidFill>
+                <a:schemeClr val="accent1">
+                  <a:lumMod val="50000"/>
+                </a:schemeClr>
+              </a:solidFill>
+              <a:cs typeface="+mn-lt"/>
+            </a:endParaRPr>
+          </a:p>
+          <a:p>
+            <a:pPr algn="l">
+              <a:lnSpc>
+                <a:spcPct val="150000"/>
+              </a:lnSpc>
+            </a:pPr>
+            <a:r>
+              <a:rPr lang="en-US" altLang="en-US" sz="2000" b="1" dirty="0">
+                <a:solidFill>
+                  <a:schemeClr val="accent1">
+                    <a:lumMod val="50000"/>
+                  </a:schemeClr>
+                </a:solidFill>
+                <a:cs typeface="+mn-lt"/>
+              </a:rPr>
+              <a:t>JsPDF &amp; htmlCanvas - Report extracting &amp; printing</a:t>
+            </a:r>
+            <a:endParaRPr lang="en-US" altLang="en-US" sz="2000" b="1" dirty="0">
+              <a:solidFill>
+                <a:schemeClr val="accent1">
+                  <a:lumMod val="50000"/>
+                </a:schemeClr>
+              </a:solidFill>
+              <a:cs typeface="+mn-lt"/>
+            </a:endParaRPr>
+          </a:p>
+          <a:p>
+            <a:pPr algn="l">
+              <a:lnSpc>
+                <a:spcPct val="150000"/>
+              </a:lnSpc>
+            </a:pPr>
+            <a:r>
+              <a:rPr lang="en-US" altLang="en-US" sz="2000" b="1" dirty="0">
+                <a:solidFill>
+                  <a:schemeClr val="accent1">
+                    <a:lumMod val="50000"/>
+                  </a:schemeClr>
+                </a:solidFill>
+                <a:cs typeface="+mn-lt"/>
+              </a:rPr>
+              <a:t>chart.js - Data visualization &amp; Report generation</a:t>
+            </a:r>
+            <a:endParaRPr lang="en-US" altLang="en-US" sz="2000" b="1" dirty="0">
+              <a:solidFill>
+                <a:schemeClr val="accent1">
+                  <a:lumMod val="50000"/>
+                </a:schemeClr>
+              </a:solidFill>
+              <a:cs typeface="+mn-lt"/>
+            </a:endParaRPr>
+          </a:p>
+          <a:p>
+            <a:pPr algn="l">
+              <a:lnSpc>
+                <a:spcPct val="150000"/>
+              </a:lnSpc>
+            </a:pPr>
+            <a:r>
+              <a:rPr lang="en-US" altLang="en-US" sz="2000" b="1" dirty="0">
+                <a:solidFill>
+                  <a:schemeClr val="accent1">
+                    <a:lumMod val="50000"/>
+                  </a:schemeClr>
+                </a:solidFill>
+                <a:cs typeface="+mn-lt"/>
+              </a:rPr>
+              <a:t>Google Maps API - Location Services</a:t>
+            </a:r>
+            <a:endParaRPr lang="en-US" altLang="en-US" sz="2000" b="1" dirty="0">
+              <a:solidFill>
+                <a:schemeClr val="accent1">
+                  <a:lumMod val="50000"/>
+                </a:schemeClr>
+              </a:solidFill>
+              <a:cs typeface="+mn-lt"/>
+            </a:endParaRPr>
+          </a:p>
+          <a:p>
+            <a:pPr algn="l">
+              <a:lnSpc>
+                <a:spcPct val="150000"/>
+              </a:lnSpc>
+            </a:pPr>
+            <a:r>
+              <a:rPr lang="" altLang="en-US" sz="2000" b="1" dirty="0">
+                <a:solidFill>
+                  <a:schemeClr val="accent1">
+                    <a:lumMod val="50000"/>
+                  </a:schemeClr>
+                </a:solidFill>
+                <a:cs typeface="+mn-lt"/>
+              </a:rPr>
+              <a:t>PayPal API - Payment Collection</a:t>
+            </a:r>
+            <a:endParaRPr lang="" altLang="en-US" sz="2000" b="1" dirty="0">
+              <a:solidFill>
+                <a:schemeClr val="accent1">
+                  <a:lumMod val="50000"/>
+                </a:schemeClr>
+              </a:solidFill>
+              <a:cs typeface="+mn-lt"/>
+            </a:endParaRPr>
+          </a:p>
+        </p:txBody>
+      </p:sp>
     </p:spTree>
   </p:cSld>
   <p:clrMapOvr>

</xml_diff>

<commit_message>
gcloud image upload and deployment done
</commit_message>
<xml_diff>
--- a/Docs/evenza,pptx.pptx
+++ b/Docs/evenza,pptx.pptx
@@ -16,13 +16,15 @@
     <p:sldId id="267" r:id="rId8"/>
     <p:sldId id="268" r:id="rId9"/>
     <p:sldId id="266" r:id="rId10"/>
-    <p:sldId id="265" r:id="rId11"/>
-    <p:sldId id="270" r:id="rId13"/>
-    <p:sldId id="291" r:id="rId14"/>
-    <p:sldId id="292" r:id="rId15"/>
-    <p:sldId id="293" r:id="rId16"/>
-    <p:sldId id="271" r:id="rId17"/>
-    <p:sldId id="295" r:id="rId18"/>
+    <p:sldId id="296" r:id="rId11"/>
+    <p:sldId id="265" r:id="rId13"/>
+    <p:sldId id="297" r:id="rId14"/>
+    <p:sldId id="270" r:id="rId15"/>
+    <p:sldId id="291" r:id="rId16"/>
+    <p:sldId id="292" r:id="rId17"/>
+    <p:sldId id="293" r:id="rId18"/>
+    <p:sldId id="271" r:id="rId19"/>
+    <p:sldId id="295" r:id="rId20"/>
   </p:sldIdLst>
   <p:sldSz cx="12192000" cy="6858000"/>
   <p:notesSz cx="7103745" cy="10234295"/>
@@ -472,6 +474,94 @@
 </file>
 
 <file path=ppt/notesSlides/notesSlide1.xml><?xml version="1.0" encoding="utf-8"?>
+<p:notes xmlns:a="http://schemas.openxmlformats.org/drawingml/2006/main" xmlns:r="http://schemas.openxmlformats.org/officeDocument/2006/relationships" xmlns:p="http://schemas.openxmlformats.org/presentationml/2006/main">
+  <p:cSld>
+    <p:spTree>
+      <p:nvGrpSpPr>
+        <p:cNvPr id="1" name=""/>
+        <p:cNvGrpSpPr/>
+        <p:nvPr/>
+      </p:nvGrpSpPr>
+      <p:grpSpPr/>
+      <p:sp>
+        <p:nvSpPr>
+          <p:cNvPr id="2" name="Slide Image Placeholder 1"/>
+          <p:cNvSpPr/>
+          <p:nvPr>
+            <p:ph type="sldImg" idx="2"/>
+          </p:nvPr>
+        </p:nvSpPr>
+        <p:spPr/>
+      </p:sp>
+      <p:sp>
+        <p:nvSpPr>
+          <p:cNvPr id="3" name="Text Placeholder 2"/>
+          <p:cNvSpPr/>
+          <p:nvPr>
+            <p:ph type="body" idx="3"/>
+          </p:nvPr>
+        </p:nvSpPr>
+        <p:spPr/>
+        <p:txBody>
+          <a:bodyPr/>
+          <a:p>
+            <a:endParaRPr lang="en-US"/>
+          </a:p>
+        </p:txBody>
+      </p:sp>
+    </p:spTree>
+  </p:cSld>
+  <p:clrMapOvr>
+    <a:masterClrMapping/>
+  </p:clrMapOvr>
+</p:notes>
+</file>
+
+<file path=ppt/notesSlides/notesSlide2.xml><?xml version="1.0" encoding="utf-8"?>
+<p:notes xmlns:a="http://schemas.openxmlformats.org/drawingml/2006/main" xmlns:r="http://schemas.openxmlformats.org/officeDocument/2006/relationships" xmlns:p="http://schemas.openxmlformats.org/presentationml/2006/main">
+  <p:cSld>
+    <p:spTree>
+      <p:nvGrpSpPr>
+        <p:cNvPr id="1" name=""/>
+        <p:cNvGrpSpPr/>
+        <p:nvPr/>
+      </p:nvGrpSpPr>
+      <p:grpSpPr/>
+      <p:sp>
+        <p:nvSpPr>
+          <p:cNvPr id="2" name="Slide Image Placeholder 1"/>
+          <p:cNvSpPr/>
+          <p:nvPr>
+            <p:ph type="sldImg" idx="2"/>
+          </p:nvPr>
+        </p:nvSpPr>
+        <p:spPr/>
+      </p:sp>
+      <p:sp>
+        <p:nvSpPr>
+          <p:cNvPr id="3" name="Text Placeholder 2"/>
+          <p:cNvSpPr/>
+          <p:nvPr>
+            <p:ph type="body" idx="3"/>
+          </p:nvPr>
+        </p:nvSpPr>
+        <p:spPr/>
+        <p:txBody>
+          <a:bodyPr/>
+          <a:p>
+            <a:endParaRPr lang="en-US"/>
+          </a:p>
+        </p:txBody>
+      </p:sp>
+    </p:spTree>
+  </p:cSld>
+  <p:clrMapOvr>
+    <a:masterClrMapping/>
+  </p:clrMapOvr>
+</p:notes>
+</file>
+
+<file path=ppt/notesSlides/notesSlide3.xml><?xml version="1.0" encoding="utf-8"?>
 <p:notes xmlns:a="http://schemas.openxmlformats.org/drawingml/2006/main" xmlns:r="http://schemas.openxmlformats.org/officeDocument/2006/relationships" xmlns:p="http://schemas.openxmlformats.org/presentationml/2006/main">
   <p:cSld>
     <p:spTree>
@@ -5612,6 +5702,1201 @@
       </p:grpSpPr>
       <p:sp>
         <p:nvSpPr>
+          <p:cNvPr id="2" name="Title 1"/>
+          <p:cNvSpPr>
+            <a:spLocks noGrp="1"/>
+          </p:cNvSpPr>
+          <p:nvPr>
+            <p:ph type="title"/>
+          </p:nvPr>
+        </p:nvSpPr>
+        <p:spPr>
+          <a:xfrm>
+            <a:off x="563245" y="407670"/>
+            <a:ext cx="10515600" cy="1325563"/>
+          </a:xfrm>
+        </p:spPr>
+        <p:txBody>
+          <a:bodyPr/>
+          <a:lstStyle/>
+          <a:p>
+            <a:pPr algn="l"/>
+            <a:r>
+              <a:rPr lang="en-US" altLang="en-US" b="1" dirty="0">
+                <a:solidFill>
+                  <a:schemeClr val="accent5">
+                    <a:lumMod val="50000"/>
+                  </a:schemeClr>
+                </a:solidFill>
+                <a:latin typeface="+mn-lt"/>
+                <a:cs typeface="+mn-lt"/>
+              </a:rPr>
+              <a:t>APIs/ Services used..</a:t>
+            </a:r>
+            <a:endParaRPr lang="en-US" altLang="en-US" b="1" dirty="0">
+              <a:solidFill>
+                <a:schemeClr val="accent5">
+                  <a:lumMod val="50000"/>
+                </a:schemeClr>
+              </a:solidFill>
+              <a:latin typeface="+mn-lt"/>
+              <a:cs typeface="+mn-lt"/>
+            </a:endParaRPr>
+          </a:p>
+        </p:txBody>
+      </p:sp>
+      <p:sp>
+        <p:nvSpPr>
+          <p:cNvPr id="24" name="Rectangle 23"/>
+          <p:cNvSpPr/>
+          <p:nvPr/>
+        </p:nvSpPr>
+        <p:spPr bwMode="auto">
+          <a:xfrm>
+            <a:off x="433705" y="6459220"/>
+            <a:ext cx="11758295" cy="403860"/>
+          </a:xfrm>
+          <a:prstGeom prst="rect">
+            <a:avLst/>
+          </a:prstGeom>
+          <a:gradFill flip="none" rotWithShape="1">
+            <a:gsLst>
+              <a:gs pos="0">
+                <a:schemeClr val="accent1">
+                  <a:alpha val="80000"/>
+                </a:schemeClr>
+              </a:gs>
+              <a:gs pos="100000">
+                <a:schemeClr val="accent2">
+                  <a:alpha val="80000"/>
+                </a:schemeClr>
+              </a:gs>
+            </a:gsLst>
+            <a:lin ang="5400000" scaled="0"/>
+            <a:tileRect/>
+          </a:gradFill>
+          <a:ln w="9525">
+            <a:noFill/>
+            <a:round/>
+          </a:ln>
+        </p:spPr>
+        <p:txBody>
+          <a:bodyPr vert="horz" wrap="square" lIns="121920" tIns="60960" rIns="121920" bIns="60960" numCol="1" rtlCol="0" anchor="t" anchorCtr="0" compatLnSpc="1"/>
+          <a:p>
+            <a:pPr algn="ctr"/>
+            <a:endParaRPr lang="en-US" sz="2400"/>
+          </a:p>
+        </p:txBody>
+      </p:sp>
+      <p:sp>
+        <p:nvSpPr>
+          <p:cNvPr id="8" name="Rectangle 7"/>
+          <p:cNvSpPr/>
+          <p:nvPr/>
+        </p:nvSpPr>
+        <p:spPr bwMode="auto">
+          <a:xfrm>
+            <a:off x="0" y="-327660"/>
+            <a:ext cx="434340" cy="1778000"/>
+          </a:xfrm>
+          <a:prstGeom prst="rect">
+            <a:avLst/>
+          </a:prstGeom>
+          <a:gradFill flip="none" rotWithShape="1">
+            <a:gsLst>
+              <a:gs pos="0">
+                <a:schemeClr val="accent1">
+                  <a:alpha val="80000"/>
+                </a:schemeClr>
+              </a:gs>
+              <a:gs pos="100000">
+                <a:schemeClr val="accent2">
+                  <a:alpha val="80000"/>
+                </a:schemeClr>
+              </a:gs>
+            </a:gsLst>
+            <a:lin ang="5400000" scaled="0"/>
+            <a:tileRect/>
+          </a:gradFill>
+          <a:ln w="9525">
+            <a:noFill/>
+            <a:round/>
+          </a:ln>
+        </p:spPr>
+        <p:txBody>
+          <a:bodyPr vert="horz" wrap="square" lIns="121920" tIns="60960" rIns="121920" bIns="60960" numCol="1" rtlCol="0" anchor="t" anchorCtr="0" compatLnSpc="1"/>
+          <a:p>
+            <a:pPr algn="ctr"/>
+            <a:endParaRPr lang="en-US" sz="2400"/>
+          </a:p>
+        </p:txBody>
+      </p:sp>
+      <p:sp>
+        <p:nvSpPr>
+          <p:cNvPr id="6" name="Content Placeholder 5"/>
+          <p:cNvSpPr>
+            <a:spLocks noGrp="1"/>
+          </p:cNvSpPr>
+          <p:nvPr>
+            <p:ph idx="1"/>
+          </p:nvPr>
+        </p:nvSpPr>
+        <p:spPr>
+          <a:xfrm>
+            <a:off x="757555" y="1342390"/>
+            <a:ext cx="10544175" cy="4394835"/>
+          </a:xfrm>
+        </p:spPr>
+        <p:txBody>
+          <a:bodyPr>
+            <a:normAutofit/>
+          </a:bodyPr>
+          <a:p>
+            <a:pPr marL="0" indent="0" algn="l">
+              <a:lnSpc>
+                <a:spcPct val="150000"/>
+              </a:lnSpc>
+              <a:buNone/>
+            </a:pPr>
+            <a:endParaRPr lang="en-US" altLang="en-US" sz="2000" b="1" dirty="0">
+              <a:solidFill>
+                <a:schemeClr val="accent1">
+                  <a:lumMod val="50000"/>
+                </a:schemeClr>
+              </a:solidFill>
+              <a:cs typeface="+mn-lt"/>
+            </a:endParaRPr>
+          </a:p>
+          <a:p>
+            <a:pPr algn="l">
+              <a:lnSpc>
+                <a:spcPct val="150000"/>
+              </a:lnSpc>
+            </a:pPr>
+            <a:r>
+              <a:rPr lang="en-US" altLang="en-US" sz="2000" b="1" dirty="0">
+                <a:solidFill>
+                  <a:schemeClr val="accent1">
+                    <a:lumMod val="50000"/>
+                  </a:schemeClr>
+                </a:solidFill>
+                <a:cs typeface="+mn-lt"/>
+              </a:rPr>
+              <a:t>Google Maps API (GeoCoder, Places, Metrix) - Location Services</a:t>
+            </a:r>
+            <a:endParaRPr lang="en-US" altLang="en-US" sz="2000" b="1" dirty="0">
+              <a:solidFill>
+                <a:schemeClr val="accent1">
+                  <a:lumMod val="50000"/>
+                </a:schemeClr>
+              </a:solidFill>
+              <a:cs typeface="+mn-lt"/>
+            </a:endParaRPr>
+          </a:p>
+          <a:p>
+            <a:pPr algn="l">
+              <a:lnSpc>
+                <a:spcPct val="150000"/>
+              </a:lnSpc>
+            </a:pPr>
+            <a:r>
+              <a:rPr lang="en-US" altLang="en-US" sz="2000" b="1" dirty="0">
+                <a:solidFill>
+                  <a:schemeClr val="accent1">
+                    <a:lumMod val="50000"/>
+                  </a:schemeClr>
+                </a:solidFill>
+                <a:cs typeface="+mn-lt"/>
+              </a:rPr>
+              <a:t>Google Cloud Storage API - Images &amp; File Uploads/ Hosting</a:t>
+            </a:r>
+            <a:endParaRPr lang="en-US" altLang="en-US" sz="2000" b="1" dirty="0">
+              <a:solidFill>
+                <a:schemeClr val="accent1">
+                  <a:lumMod val="50000"/>
+                </a:schemeClr>
+              </a:solidFill>
+              <a:cs typeface="+mn-lt"/>
+            </a:endParaRPr>
+          </a:p>
+          <a:p>
+            <a:pPr algn="l">
+              <a:lnSpc>
+                <a:spcPct val="150000"/>
+              </a:lnSpc>
+            </a:pPr>
+            <a:r>
+              <a:rPr lang="en-US" altLang="en-US" sz="2000" b="1" dirty="0">
+                <a:solidFill>
+                  <a:schemeClr val="accent1">
+                    <a:lumMod val="50000"/>
+                  </a:schemeClr>
+                </a:solidFill>
+                <a:cs typeface="+mn-lt"/>
+              </a:rPr>
+              <a:t>PayPal API - Payment Collection, Recieving</a:t>
+            </a:r>
+            <a:endParaRPr lang="en-US" altLang="en-US" sz="2000" b="1" dirty="0">
+              <a:solidFill>
+                <a:schemeClr val="accent1">
+                  <a:lumMod val="50000"/>
+                </a:schemeClr>
+              </a:solidFill>
+              <a:cs typeface="+mn-lt"/>
+            </a:endParaRPr>
+          </a:p>
+          <a:p>
+            <a:pPr algn="l">
+              <a:lnSpc>
+                <a:spcPct val="150000"/>
+              </a:lnSpc>
+            </a:pPr>
+            <a:r>
+              <a:rPr lang="en-US" altLang="en-US" sz="2000" b="1" dirty="0">
+                <a:solidFill>
+                  <a:schemeClr val="accent1">
+                    <a:lumMod val="50000"/>
+                  </a:schemeClr>
+                </a:solidFill>
+                <a:cs typeface="+mn-lt"/>
+              </a:rPr>
+              <a:t>Heroku API &amp; Services - Backend Application Hosting</a:t>
+            </a:r>
+            <a:endParaRPr lang="en-US" altLang="en-US" sz="2000" b="1" dirty="0">
+              <a:solidFill>
+                <a:schemeClr val="accent1">
+                  <a:lumMod val="50000"/>
+                </a:schemeClr>
+              </a:solidFill>
+              <a:cs typeface="+mn-lt"/>
+            </a:endParaRPr>
+          </a:p>
+          <a:p>
+            <a:pPr algn="l">
+              <a:lnSpc>
+                <a:spcPct val="150000"/>
+              </a:lnSpc>
+            </a:pPr>
+            <a:r>
+              <a:rPr lang="en-US" altLang="en-US" sz="2000" b="1" dirty="0">
+                <a:solidFill>
+                  <a:schemeClr val="accent1">
+                    <a:lumMod val="50000"/>
+                  </a:schemeClr>
+                </a:solidFill>
+                <a:cs typeface="+mn-lt"/>
+              </a:rPr>
+              <a:t>Socket.io - Socket Services for Realtime Chat, Notification Hadling</a:t>
+            </a:r>
+            <a:endParaRPr lang="en-US" altLang="en-US" sz="2000" b="1" dirty="0">
+              <a:solidFill>
+                <a:schemeClr val="accent1">
+                  <a:lumMod val="50000"/>
+                </a:schemeClr>
+              </a:solidFill>
+              <a:cs typeface="+mn-lt"/>
+            </a:endParaRPr>
+          </a:p>
+        </p:txBody>
+      </p:sp>
+      <p:pic>
+        <p:nvPicPr>
+          <p:cNvPr id="3" name="Picture 2" descr="1_9hwcv7fEVKEw5LyWFok-lA"/>
+          <p:cNvPicPr>
+            <a:picLocks noChangeAspect="1"/>
+          </p:cNvPicPr>
+          <p:nvPr/>
+        </p:nvPicPr>
+        <p:blipFill>
+          <a:blip r:embed="rId1"/>
+          <a:stretch>
+            <a:fillRect/>
+          </a:stretch>
+        </p:blipFill>
+        <p:spPr>
+          <a:xfrm>
+            <a:off x="4202430" y="4845050"/>
+            <a:ext cx="2894965" cy="1358900"/>
+          </a:xfrm>
+          <a:prstGeom prst="rect">
+            <a:avLst/>
+          </a:prstGeom>
+        </p:spPr>
+      </p:pic>
+      <p:pic>
+        <p:nvPicPr>
+          <p:cNvPr id="4" name="Picture 3" descr="5c9dcc95ea2fc-resize-710x380"/>
+          <p:cNvPicPr>
+            <a:picLocks noChangeAspect="1"/>
+          </p:cNvPicPr>
+          <p:nvPr/>
+        </p:nvPicPr>
+        <p:blipFill>
+          <a:blip r:embed="rId2"/>
+          <a:stretch>
+            <a:fillRect/>
+          </a:stretch>
+        </p:blipFill>
+        <p:spPr>
+          <a:xfrm>
+            <a:off x="7175500" y="5034280"/>
+            <a:ext cx="1833880" cy="981710"/>
+          </a:xfrm>
+          <a:prstGeom prst="rect">
+            <a:avLst/>
+          </a:prstGeom>
+        </p:spPr>
+      </p:pic>
+      <p:pic>
+        <p:nvPicPr>
+          <p:cNvPr id="5" name="Picture 4" descr="1200px-Google-Cloud-Storage-Logo"/>
+          <p:cNvPicPr>
+            <a:picLocks noChangeAspect="1"/>
+          </p:cNvPicPr>
+          <p:nvPr/>
+        </p:nvPicPr>
+        <p:blipFill>
+          <a:blip r:embed="rId3"/>
+          <a:stretch>
+            <a:fillRect/>
+          </a:stretch>
+        </p:blipFill>
+        <p:spPr>
+          <a:xfrm>
+            <a:off x="3044825" y="4961255"/>
+            <a:ext cx="1015365" cy="1015365"/>
+          </a:xfrm>
+          <a:prstGeom prst="rect">
+            <a:avLst/>
+          </a:prstGeom>
+        </p:spPr>
+      </p:pic>
+      <p:pic>
+        <p:nvPicPr>
+          <p:cNvPr id="11" name="Picture 10" descr="salesforce-heroku"/>
+          <p:cNvPicPr>
+            <a:picLocks noChangeAspect="1"/>
+          </p:cNvPicPr>
+          <p:nvPr/>
+        </p:nvPicPr>
+        <p:blipFill>
+          <a:blip r:embed="rId4"/>
+          <a:stretch>
+            <a:fillRect/>
+          </a:stretch>
+        </p:blipFill>
+        <p:spPr>
+          <a:xfrm>
+            <a:off x="8288020" y="4735195"/>
+            <a:ext cx="2841625" cy="1491615"/>
+          </a:xfrm>
+          <a:prstGeom prst="rect">
+            <a:avLst/>
+          </a:prstGeom>
+        </p:spPr>
+      </p:pic>
+      <p:pic>
+        <p:nvPicPr>
+          <p:cNvPr id="13" name="Picture 12" descr="abc"/>
+          <p:cNvPicPr>
+            <a:picLocks noChangeAspect="1"/>
+          </p:cNvPicPr>
+          <p:nvPr/>
+        </p:nvPicPr>
+        <p:blipFill>
+          <a:blip r:embed="rId5"/>
+          <a:stretch>
+            <a:fillRect/>
+          </a:stretch>
+        </p:blipFill>
+        <p:spPr>
+          <a:xfrm>
+            <a:off x="1593215" y="4870450"/>
+            <a:ext cx="1197610" cy="1197610"/>
+          </a:xfrm>
+          <a:prstGeom prst="rect">
+            <a:avLst/>
+          </a:prstGeom>
+        </p:spPr>
+      </p:pic>
+    </p:spTree>
+  </p:cSld>
+  <p:clrMapOvr>
+    <a:masterClrMapping/>
+  </p:clrMapOvr>
+  <p:transition/>
+</p:sld>
+</file>
+
+<file path=ppt/slides/slide11.xml><?xml version="1.0" encoding="utf-8"?>
+<p:sld xmlns:a="http://schemas.openxmlformats.org/drawingml/2006/main" xmlns:r="http://schemas.openxmlformats.org/officeDocument/2006/relationships" xmlns:p="http://schemas.openxmlformats.org/presentationml/2006/main">
+  <p:cSld>
+    <p:spTree>
+      <p:nvGrpSpPr>
+        <p:cNvPr id="1" name=""/>
+        <p:cNvGrpSpPr/>
+        <p:nvPr/>
+      </p:nvGrpSpPr>
+      <p:grpSpPr>
+        <a:xfrm>
+          <a:off x="0" y="0"/>
+          <a:ext cx="0" cy="0"/>
+          <a:chOff x="0" y="0"/>
+          <a:chExt cx="0" cy="0"/>
+        </a:xfrm>
+      </p:grpSpPr>
+      <p:sp>
+        <p:nvSpPr>
+          <p:cNvPr id="2" name="Title 1"/>
+          <p:cNvSpPr>
+            <a:spLocks noGrp="1"/>
+          </p:cNvSpPr>
+          <p:nvPr>
+            <p:ph type="title"/>
+          </p:nvPr>
+        </p:nvSpPr>
+        <p:spPr>
+          <a:xfrm>
+            <a:off x="563245" y="407670"/>
+            <a:ext cx="10515600" cy="1325563"/>
+          </a:xfrm>
+        </p:spPr>
+        <p:txBody>
+          <a:bodyPr/>
+          <a:lstStyle/>
+          <a:p>
+            <a:pPr algn="l"/>
+            <a:r>
+              <a:rPr lang="en-US" altLang="en-US" b="1" dirty="0">
+                <a:solidFill>
+                  <a:schemeClr val="accent5">
+                    <a:lumMod val="50000"/>
+                  </a:schemeClr>
+                </a:solidFill>
+                <a:latin typeface="+mn-lt"/>
+                <a:cs typeface="+mn-lt"/>
+              </a:rPr>
+              <a:t>Releases..</a:t>
+            </a:r>
+            <a:endParaRPr lang="en-US" altLang="en-US" b="1" dirty="0">
+              <a:solidFill>
+                <a:schemeClr val="accent5">
+                  <a:lumMod val="50000"/>
+                </a:schemeClr>
+              </a:solidFill>
+              <a:latin typeface="+mn-lt"/>
+              <a:cs typeface="+mn-lt"/>
+            </a:endParaRPr>
+          </a:p>
+        </p:txBody>
+      </p:sp>
+      <p:sp>
+        <p:nvSpPr>
+          <p:cNvPr id="24" name="Rectangle 23"/>
+          <p:cNvSpPr/>
+          <p:nvPr/>
+        </p:nvSpPr>
+        <p:spPr bwMode="auto">
+          <a:xfrm>
+            <a:off x="433705" y="6459220"/>
+            <a:ext cx="11758295" cy="403860"/>
+          </a:xfrm>
+          <a:prstGeom prst="rect">
+            <a:avLst/>
+          </a:prstGeom>
+          <a:gradFill flip="none" rotWithShape="1">
+            <a:gsLst>
+              <a:gs pos="0">
+                <a:schemeClr val="accent1">
+                  <a:alpha val="80000"/>
+                </a:schemeClr>
+              </a:gs>
+              <a:gs pos="100000">
+                <a:schemeClr val="accent2">
+                  <a:alpha val="80000"/>
+                </a:schemeClr>
+              </a:gs>
+            </a:gsLst>
+            <a:lin ang="5400000" scaled="0"/>
+            <a:tileRect/>
+          </a:gradFill>
+          <a:ln w="9525">
+            <a:noFill/>
+            <a:round/>
+          </a:ln>
+        </p:spPr>
+        <p:txBody>
+          <a:bodyPr vert="horz" wrap="square" lIns="121920" tIns="60960" rIns="121920" bIns="60960" numCol="1" rtlCol="0" anchor="t" anchorCtr="0" compatLnSpc="1"/>
+          <a:p>
+            <a:pPr algn="ctr"/>
+            <a:endParaRPr lang="en-US" sz="2400"/>
+          </a:p>
+        </p:txBody>
+      </p:sp>
+      <p:sp>
+        <p:nvSpPr>
+          <p:cNvPr id="8" name="Rectangle 7"/>
+          <p:cNvSpPr/>
+          <p:nvPr/>
+        </p:nvSpPr>
+        <p:spPr bwMode="auto">
+          <a:xfrm>
+            <a:off x="0" y="-327660"/>
+            <a:ext cx="434340" cy="1778000"/>
+          </a:xfrm>
+          <a:prstGeom prst="rect">
+            <a:avLst/>
+          </a:prstGeom>
+          <a:gradFill flip="none" rotWithShape="1">
+            <a:gsLst>
+              <a:gs pos="0">
+                <a:schemeClr val="accent1">
+                  <a:alpha val="80000"/>
+                </a:schemeClr>
+              </a:gs>
+              <a:gs pos="100000">
+                <a:schemeClr val="accent2">
+                  <a:alpha val="80000"/>
+                </a:schemeClr>
+              </a:gs>
+            </a:gsLst>
+            <a:lin ang="5400000" scaled="0"/>
+            <a:tileRect/>
+          </a:gradFill>
+          <a:ln w="9525">
+            <a:noFill/>
+            <a:round/>
+          </a:ln>
+        </p:spPr>
+        <p:txBody>
+          <a:bodyPr vert="horz" wrap="square" lIns="121920" tIns="60960" rIns="121920" bIns="60960" numCol="1" rtlCol="0" anchor="t" anchorCtr="0" compatLnSpc="1"/>
+          <a:p>
+            <a:pPr algn="ctr"/>
+            <a:endParaRPr lang="en-US" sz="2400"/>
+          </a:p>
+        </p:txBody>
+      </p:sp>
+      <p:sp>
+        <p:nvSpPr>
+          <p:cNvPr id="6" name="Content Placeholder 5"/>
+          <p:cNvSpPr>
+            <a:spLocks noGrp="1"/>
+          </p:cNvSpPr>
+          <p:nvPr>
+            <p:ph idx="1"/>
+          </p:nvPr>
+        </p:nvSpPr>
+        <p:spPr>
+          <a:xfrm>
+            <a:off x="823595" y="1536065"/>
+            <a:ext cx="10720070" cy="1432560"/>
+          </a:xfrm>
+        </p:spPr>
+        <p:txBody>
+          <a:bodyPr>
+            <a:normAutofit/>
+          </a:bodyPr>
+          <a:p>
+            <a:pPr algn="l">
+              <a:lnSpc>
+                <a:spcPct val="150000"/>
+              </a:lnSpc>
+            </a:pPr>
+            <a:r>
+              <a:rPr lang="en-US" altLang="en-US" sz="2400" b="1" dirty="0">
+                <a:solidFill>
+                  <a:schemeClr val="accent1">
+                    <a:lumMod val="50000"/>
+                  </a:schemeClr>
+                </a:solidFill>
+                <a:cs typeface="+mn-lt"/>
+              </a:rPr>
+              <a:t>Web Based System Developed, Tested and Deployed</a:t>
+            </a:r>
+            <a:endParaRPr lang="en-US" altLang="en-US" sz="2000" b="1" dirty="0">
+              <a:solidFill>
+                <a:schemeClr val="accent1">
+                  <a:lumMod val="50000"/>
+                </a:schemeClr>
+              </a:solidFill>
+              <a:cs typeface="+mn-lt"/>
+            </a:endParaRPr>
+          </a:p>
+          <a:p>
+            <a:pPr lvl="1" algn="l">
+              <a:lnSpc>
+                <a:spcPct val="150000"/>
+              </a:lnSpc>
+            </a:pPr>
+            <a:r>
+              <a:rPr lang="en-US" altLang="en-US" sz="1750" b="1" dirty="0">
+                <a:solidFill>
+                  <a:schemeClr val="accent1">
+                    <a:lumMod val="50000"/>
+                  </a:schemeClr>
+                </a:solidFill>
+                <a:cs typeface="+mn-lt"/>
+              </a:rPr>
+              <a:t>On Google Cloud App Engine (PaaS) </a:t>
+            </a:r>
+            <a:endParaRPr lang="en-US" altLang="en-US" sz="1750" b="1" dirty="0">
+              <a:solidFill>
+                <a:schemeClr val="accent1">
+                  <a:lumMod val="50000"/>
+                </a:schemeClr>
+              </a:solidFill>
+              <a:cs typeface="+mn-lt"/>
+            </a:endParaRPr>
+          </a:p>
+          <a:p>
+            <a:pPr lvl="1" algn="l">
+              <a:lnSpc>
+                <a:spcPct val="150000"/>
+              </a:lnSpc>
+              <a:buFont typeface="Arial" panose="02080604020202020204" pitchFamily="34" charset="0"/>
+              <a:buChar char="•"/>
+            </a:pPr>
+            <a:endParaRPr lang="en-US" altLang="en-US" sz="2400" b="1" dirty="0">
+              <a:solidFill>
+                <a:schemeClr val="accent1">
+                  <a:lumMod val="50000"/>
+                </a:schemeClr>
+              </a:solidFill>
+              <a:cs typeface="+mn-lt"/>
+            </a:endParaRPr>
+          </a:p>
+        </p:txBody>
+      </p:sp>
+      <p:sp>
+        <p:nvSpPr>
+          <p:cNvPr id="3" name="Text Box 2"/>
+          <p:cNvSpPr txBox="1"/>
+          <p:nvPr/>
+        </p:nvSpPr>
+        <p:spPr>
+          <a:xfrm>
+            <a:off x="380365" y="3764915"/>
+            <a:ext cx="10908665" cy="645160"/>
+          </a:xfrm>
+          <a:prstGeom prst="rect">
+            <a:avLst/>
+          </a:prstGeom>
+          <a:noFill/>
+        </p:spPr>
+        <p:txBody>
+          <a:bodyPr wrap="square" rtlCol="0" anchor="t">
+            <a:spAutoFit/>
+          </a:bodyPr>
+          <a:p>
+            <a:pPr lvl="1" algn="l">
+              <a:lnSpc>
+                <a:spcPct val="150000"/>
+              </a:lnSpc>
+              <a:buFont typeface="Arial" panose="02080604020202020204" pitchFamily="34" charset="0"/>
+              <a:buChar char="•"/>
+            </a:pPr>
+            <a:r>
+              <a:rPr lang="en-US" altLang="en-US" sz="2400" b="1" dirty="0">
+                <a:solidFill>
+                  <a:schemeClr val="accent1">
+                    <a:lumMod val="50000"/>
+                  </a:schemeClr>
+                </a:solidFill>
+                <a:cs typeface="+mn-lt"/>
+                <a:sym typeface="+mn-ea"/>
+              </a:rPr>
+              <a:t> PWA ( Prgressive web Application) Developed for Mobiles</a:t>
+            </a:r>
+            <a:endParaRPr lang="en-US" altLang="en-US" sz="2400" b="1" dirty="0">
+              <a:solidFill>
+                <a:schemeClr val="accent1">
+                  <a:lumMod val="50000"/>
+                </a:schemeClr>
+              </a:solidFill>
+              <a:cs typeface="+mn-lt"/>
+              <a:sym typeface="+mn-ea"/>
+            </a:endParaRPr>
+          </a:p>
+        </p:txBody>
+      </p:sp>
+      <p:sp>
+        <p:nvSpPr>
+          <p:cNvPr id="4" name="Text Box 3"/>
+          <p:cNvSpPr txBox="1"/>
+          <p:nvPr/>
+        </p:nvSpPr>
+        <p:spPr>
+          <a:xfrm>
+            <a:off x="367030" y="2574925"/>
+            <a:ext cx="10908665" cy="1198880"/>
+          </a:xfrm>
+          <a:prstGeom prst="rect">
+            <a:avLst/>
+          </a:prstGeom>
+          <a:noFill/>
+        </p:spPr>
+        <p:txBody>
+          <a:bodyPr wrap="square" rtlCol="0" anchor="t">
+            <a:spAutoFit/>
+          </a:bodyPr>
+          <a:p>
+            <a:pPr lvl="1" algn="l">
+              <a:lnSpc>
+                <a:spcPct val="150000"/>
+              </a:lnSpc>
+              <a:buFont typeface="Arial" panose="02080604020202020204" pitchFamily="34" charset="0"/>
+              <a:buChar char="•"/>
+            </a:pPr>
+            <a:r>
+              <a:rPr lang="en-US" altLang="en-US" sz="2400" b="1" dirty="0">
+                <a:solidFill>
+                  <a:schemeClr val="accent1">
+                    <a:lumMod val="50000"/>
+                  </a:schemeClr>
+                </a:solidFill>
+                <a:cs typeface="+mn-lt"/>
+                <a:sym typeface="+mn-ea"/>
+              </a:rPr>
+              <a:t> Database Deployed on Cloud</a:t>
+            </a:r>
+            <a:endParaRPr lang="en-US" altLang="en-US" sz="2400" b="1" dirty="0">
+              <a:solidFill>
+                <a:schemeClr val="accent1">
+                  <a:lumMod val="50000"/>
+                </a:schemeClr>
+              </a:solidFill>
+              <a:cs typeface="+mn-lt"/>
+              <a:sym typeface="+mn-ea"/>
+            </a:endParaRPr>
+          </a:p>
+          <a:p>
+            <a:pPr lvl="2" indent="0" algn="l">
+              <a:lnSpc>
+                <a:spcPct val="150000"/>
+              </a:lnSpc>
+              <a:buNone/>
+            </a:pPr>
+            <a:r>
+              <a:rPr lang="en-US" altLang="en-US" sz="2400" dirty="0">
+                <a:solidFill>
+                  <a:schemeClr val="accent1">
+                    <a:lumMod val="50000"/>
+                  </a:schemeClr>
+                </a:solidFill>
+                <a:cs typeface="+mn-lt"/>
+                <a:sym typeface="+mn-ea"/>
+              </a:rPr>
+              <a:t>-</a:t>
+            </a:r>
+            <a:r>
+              <a:rPr lang="en-US" altLang="en-US" sz="2400" b="1" dirty="0">
+                <a:solidFill>
+                  <a:schemeClr val="accent1">
+                    <a:lumMod val="50000"/>
+                  </a:schemeClr>
+                </a:solidFill>
+                <a:cs typeface="+mn-lt"/>
+                <a:sym typeface="+mn-ea"/>
+              </a:rPr>
+              <a:t> </a:t>
+            </a:r>
+            <a:r>
+              <a:rPr lang="en-US" altLang="en-US" sz="2000" b="1" dirty="0">
+                <a:solidFill>
+                  <a:schemeClr val="accent1">
+                    <a:lumMod val="50000"/>
+                  </a:schemeClr>
+                </a:solidFill>
+                <a:cs typeface="+mn-lt"/>
+                <a:sym typeface="+mn-ea"/>
+              </a:rPr>
+              <a:t>Realtime, Clustered on MongoDB Atlas</a:t>
+            </a:r>
+            <a:endParaRPr lang="en-US" altLang="en-US" sz="2000" b="1" dirty="0">
+              <a:solidFill>
+                <a:schemeClr val="accent1">
+                  <a:lumMod val="50000"/>
+                </a:schemeClr>
+              </a:solidFill>
+              <a:cs typeface="+mn-lt"/>
+              <a:sym typeface="+mn-ea"/>
+            </a:endParaRPr>
+          </a:p>
+        </p:txBody>
+      </p:sp>
+      <p:sp>
+        <p:nvSpPr>
+          <p:cNvPr id="5" name="Rectangle 4"/>
+          <p:cNvSpPr/>
+          <p:nvPr/>
+        </p:nvSpPr>
+        <p:spPr>
+          <a:xfrm>
+            <a:off x="3193415" y="5361305"/>
+            <a:ext cx="5508625" cy="596265"/>
+          </a:xfrm>
+          <a:prstGeom prst="rect">
+            <a:avLst/>
+          </a:prstGeom>
+          <a:solidFill>
+            <a:schemeClr val="bg2">
+              <a:lumMod val="90000"/>
+            </a:schemeClr>
+          </a:solidFill>
+          <a:ln>
+            <a:noFill/>
+          </a:ln>
+        </p:spPr>
+        <p:style>
+          <a:lnRef idx="1">
+            <a:schemeClr val="accent3"/>
+          </a:lnRef>
+          <a:fillRef idx="2">
+            <a:schemeClr val="accent3"/>
+          </a:fillRef>
+          <a:effectRef idx="1">
+            <a:schemeClr val="accent3"/>
+          </a:effectRef>
+          <a:fontRef idx="minor">
+            <a:schemeClr val="dk1"/>
+          </a:fontRef>
+        </p:style>
+        <p:txBody>
+          <a:bodyPr rtlCol="0" anchor="ctr"/>
+          <a:p>
+            <a:pPr algn="ctr"/>
+            <a:endParaRPr lang="en-US"/>
+          </a:p>
+        </p:txBody>
+      </p:sp>
+      <p:sp>
+        <p:nvSpPr>
+          <p:cNvPr id="7" name="Content Placeholder 5"/>
+          <p:cNvSpPr>
+            <a:spLocks noGrp="1"/>
+          </p:cNvSpPr>
+          <p:nvPr/>
+        </p:nvSpPr>
+        <p:spPr>
+          <a:xfrm>
+            <a:off x="3193415" y="5363845"/>
+            <a:ext cx="5683885" cy="593725"/>
+          </a:xfrm>
+          <a:prstGeom prst="rect">
+            <a:avLst/>
+          </a:prstGeom>
+          <a:noFill/>
+          <a:ln w="9525">
+            <a:noFill/>
+          </a:ln>
+        </p:spPr>
+        <p:txBody>
+          <a:bodyPr>
+            <a:normAutofit/>
+          </a:bodyPr>
+          <a:lstStyle>
+            <a:lvl1pPr marL="342900" lvl="0" indent="-342900" algn="l" defTabSz="914400" eaLnBrk="1" fontAlgn="base" latinLnBrk="0" hangingPunct="1">
+              <a:lnSpc>
+                <a:spcPct val="100000"/>
+              </a:lnSpc>
+              <a:spcBef>
+                <a:spcPct val="20000"/>
+              </a:spcBef>
+              <a:spcAft>
+                <a:spcPct val="0"/>
+              </a:spcAft>
+              <a:buChar char="•"/>
+              <a:defRPr sz="3200" b="0" i="0" u="none" kern="1200" baseline="0">
+                <a:solidFill>
+                  <a:schemeClr val="tx1"/>
+                </a:solidFill>
+                <a:latin typeface="+mn-lt"/>
+                <a:ea typeface="+mn-ea"/>
+                <a:cs typeface="+mn-cs"/>
+              </a:defRPr>
+            </a:lvl1pPr>
+            <a:lvl2pPr marL="742950" lvl="1" indent="-285750" algn="l" defTabSz="914400" eaLnBrk="1" fontAlgn="base" latinLnBrk="0" hangingPunct="1">
+              <a:lnSpc>
+                <a:spcPct val="100000"/>
+              </a:lnSpc>
+              <a:spcBef>
+                <a:spcPct val="20000"/>
+              </a:spcBef>
+              <a:spcAft>
+                <a:spcPct val="0"/>
+              </a:spcAft>
+              <a:buChar char="–"/>
+              <a:defRPr sz="2800" b="0" i="0" u="none" kern="1200" baseline="0">
+                <a:solidFill>
+                  <a:schemeClr val="tx1"/>
+                </a:solidFill>
+                <a:latin typeface="+mn-lt"/>
+                <a:ea typeface="+mn-ea"/>
+                <a:cs typeface="+mn-cs"/>
+              </a:defRPr>
+            </a:lvl2pPr>
+            <a:lvl3pPr marL="1143000" lvl="2" indent="-228600" algn="l" defTabSz="914400" eaLnBrk="1" fontAlgn="base" latinLnBrk="0" hangingPunct="1">
+              <a:lnSpc>
+                <a:spcPct val="100000"/>
+              </a:lnSpc>
+              <a:spcBef>
+                <a:spcPct val="20000"/>
+              </a:spcBef>
+              <a:spcAft>
+                <a:spcPct val="0"/>
+              </a:spcAft>
+              <a:buChar char="•"/>
+              <a:defRPr sz="2400" b="0" i="0" u="none" kern="1200" baseline="0">
+                <a:solidFill>
+                  <a:schemeClr val="tx1"/>
+                </a:solidFill>
+                <a:latin typeface="+mn-lt"/>
+                <a:ea typeface="+mn-ea"/>
+                <a:cs typeface="+mn-cs"/>
+              </a:defRPr>
+            </a:lvl3pPr>
+            <a:lvl4pPr marL="1600200" lvl="3" indent="-228600" algn="l" defTabSz="914400" eaLnBrk="1" fontAlgn="base" latinLnBrk="0" hangingPunct="1">
+              <a:lnSpc>
+                <a:spcPct val="100000"/>
+              </a:lnSpc>
+              <a:spcBef>
+                <a:spcPct val="20000"/>
+              </a:spcBef>
+              <a:spcAft>
+                <a:spcPct val="0"/>
+              </a:spcAft>
+              <a:buChar char="–"/>
+              <a:defRPr sz="2000" b="0" i="0" u="none" kern="1200" baseline="0">
+                <a:solidFill>
+                  <a:schemeClr val="tx1"/>
+                </a:solidFill>
+                <a:latin typeface="+mn-lt"/>
+                <a:ea typeface="+mn-ea"/>
+                <a:cs typeface="+mn-cs"/>
+              </a:defRPr>
+            </a:lvl4pPr>
+            <a:lvl5pPr marL="2057400" lvl="4" indent="-228600" algn="l" defTabSz="914400" eaLnBrk="1" fontAlgn="base" latinLnBrk="0" hangingPunct="1">
+              <a:lnSpc>
+                <a:spcPct val="100000"/>
+              </a:lnSpc>
+              <a:spcBef>
+                <a:spcPct val="20000"/>
+              </a:spcBef>
+              <a:spcAft>
+                <a:spcPct val="0"/>
+              </a:spcAft>
+              <a:buChar char="»"/>
+              <a:defRPr sz="2000" b="0" i="0" u="none" kern="1200" baseline="0">
+                <a:solidFill>
+                  <a:schemeClr val="tx1"/>
+                </a:solidFill>
+                <a:latin typeface="+mn-lt"/>
+                <a:ea typeface="+mn-ea"/>
+                <a:cs typeface="+mn-cs"/>
+              </a:defRPr>
+            </a:lvl5pPr>
+            <a:lvl6pPr marL="2514600" lvl="5" indent="-228600" algn="l" defTabSz="914400" eaLnBrk="1" fontAlgn="base" latinLnBrk="0" hangingPunct="1">
+              <a:lnSpc>
+                <a:spcPct val="100000"/>
+              </a:lnSpc>
+              <a:spcBef>
+                <a:spcPct val="20000"/>
+              </a:spcBef>
+              <a:spcAft>
+                <a:spcPct val="0"/>
+              </a:spcAft>
+              <a:buChar char="»"/>
+              <a:defRPr sz="2000" b="0" i="0" u="none" kern="1200" baseline="0">
+                <a:solidFill>
+                  <a:schemeClr val="tx1"/>
+                </a:solidFill>
+                <a:latin typeface="+mn-lt"/>
+                <a:ea typeface="+mn-ea"/>
+                <a:cs typeface="+mn-cs"/>
+              </a:defRPr>
+            </a:lvl6pPr>
+            <a:lvl7pPr marL="2971800" lvl="6" indent="-228600" algn="l" defTabSz="914400" eaLnBrk="1" fontAlgn="base" latinLnBrk="0" hangingPunct="1">
+              <a:lnSpc>
+                <a:spcPct val="100000"/>
+              </a:lnSpc>
+              <a:spcBef>
+                <a:spcPct val="20000"/>
+              </a:spcBef>
+              <a:spcAft>
+                <a:spcPct val="0"/>
+              </a:spcAft>
+              <a:buChar char="»"/>
+              <a:defRPr sz="2000" b="0" i="0" u="none" kern="1200" baseline="0">
+                <a:solidFill>
+                  <a:schemeClr val="tx1"/>
+                </a:solidFill>
+                <a:latin typeface="+mn-lt"/>
+                <a:ea typeface="+mn-ea"/>
+                <a:cs typeface="+mn-cs"/>
+              </a:defRPr>
+            </a:lvl7pPr>
+            <a:lvl8pPr marL="3429000" lvl="7" indent="-228600" algn="l" defTabSz="914400" eaLnBrk="1" fontAlgn="base" latinLnBrk="0" hangingPunct="1">
+              <a:lnSpc>
+                <a:spcPct val="100000"/>
+              </a:lnSpc>
+              <a:spcBef>
+                <a:spcPct val="20000"/>
+              </a:spcBef>
+              <a:spcAft>
+                <a:spcPct val="0"/>
+              </a:spcAft>
+              <a:buChar char="»"/>
+              <a:defRPr sz="2000" b="0" i="0" u="none" kern="1200" baseline="0">
+                <a:solidFill>
+                  <a:schemeClr val="tx1"/>
+                </a:solidFill>
+                <a:latin typeface="+mn-lt"/>
+                <a:ea typeface="+mn-ea"/>
+                <a:cs typeface="+mn-cs"/>
+              </a:defRPr>
+            </a:lvl8pPr>
+            <a:lvl9pPr marL="3886200" lvl="8" indent="-228600" algn="l" defTabSz="914400" eaLnBrk="1" fontAlgn="base" latinLnBrk="0" hangingPunct="1">
+              <a:lnSpc>
+                <a:spcPct val="100000"/>
+              </a:lnSpc>
+              <a:spcBef>
+                <a:spcPct val="20000"/>
+              </a:spcBef>
+              <a:spcAft>
+                <a:spcPct val="0"/>
+              </a:spcAft>
+              <a:buChar char="»"/>
+              <a:defRPr sz="2000" b="0" i="0" u="none" kern="1200" baseline="0">
+                <a:solidFill>
+                  <a:schemeClr val="tx1"/>
+                </a:solidFill>
+                <a:latin typeface="+mn-lt"/>
+                <a:ea typeface="+mn-ea"/>
+                <a:cs typeface="+mn-cs"/>
+              </a:defRPr>
+            </a:lvl9pPr>
+          </a:lstStyle>
+          <a:p>
+            <a:pPr marL="0" indent="0" algn="ctr">
+              <a:lnSpc>
+                <a:spcPct val="100000"/>
+              </a:lnSpc>
+              <a:buNone/>
+            </a:pPr>
+            <a:r>
+              <a:rPr lang="en-US" altLang="en-US" b="1" dirty="0">
+                <a:solidFill>
+                  <a:schemeClr val="tx2">
+                    <a:lumMod val="75000"/>
+                  </a:schemeClr>
+                </a:solidFill>
+                <a:cs typeface="+mn-lt"/>
+              </a:rPr>
+              <a:t>http://evenza.biz</a:t>
+            </a:r>
+            <a:endParaRPr lang="en-US" altLang="en-US" b="1" dirty="0">
+              <a:solidFill>
+                <a:schemeClr val="tx2">
+                  <a:lumMod val="75000"/>
+                </a:schemeClr>
+              </a:solidFill>
+              <a:cs typeface="+mn-lt"/>
+            </a:endParaRPr>
+          </a:p>
+        </p:txBody>
+      </p:sp>
+      <p:sp>
+        <p:nvSpPr>
+          <p:cNvPr id="9" name="Text Box 8"/>
+          <p:cNvSpPr txBox="1"/>
+          <p:nvPr/>
+        </p:nvSpPr>
+        <p:spPr>
+          <a:xfrm>
+            <a:off x="367030" y="4377690"/>
+            <a:ext cx="10908665" cy="645160"/>
+          </a:xfrm>
+          <a:prstGeom prst="rect">
+            <a:avLst/>
+          </a:prstGeom>
+          <a:noFill/>
+        </p:spPr>
+        <p:txBody>
+          <a:bodyPr wrap="square" rtlCol="0" anchor="t">
+            <a:spAutoFit/>
+          </a:bodyPr>
+          <a:p>
+            <a:pPr lvl="1" algn="l">
+              <a:lnSpc>
+                <a:spcPct val="150000"/>
+              </a:lnSpc>
+              <a:buFont typeface="Arial" panose="02080604020202020204" pitchFamily="34" charset="0"/>
+              <a:buChar char="•"/>
+            </a:pPr>
+            <a:r>
+              <a:rPr lang="en-US" altLang="en-US" sz="2400" b="1" dirty="0">
+                <a:solidFill>
+                  <a:schemeClr val="accent1">
+                    <a:lumMod val="50000"/>
+                  </a:schemeClr>
+                </a:solidFill>
+                <a:cs typeface="+mn-lt"/>
+                <a:sym typeface="+mn-ea"/>
+              </a:rPr>
+              <a:t> </a:t>
+            </a:r>
+            <a:r>
+              <a:rPr lang="" altLang="en-US" sz="2400" b="1" dirty="0">
+                <a:solidFill>
+                  <a:schemeClr val="accent1">
+                    <a:lumMod val="50000"/>
+                  </a:schemeClr>
+                </a:solidFill>
+                <a:cs typeface="+mn-lt"/>
+                <a:sym typeface="+mn-ea"/>
+              </a:rPr>
+              <a:t>Complete Documentation (User Guides, Design, API Docs)</a:t>
+            </a:r>
+            <a:endParaRPr lang="" altLang="en-US" sz="2400" b="1" dirty="0">
+              <a:solidFill>
+                <a:schemeClr val="accent1">
+                  <a:lumMod val="50000"/>
+                </a:schemeClr>
+              </a:solidFill>
+              <a:cs typeface="+mn-lt"/>
+              <a:sym typeface="+mn-ea"/>
+            </a:endParaRPr>
+          </a:p>
+        </p:txBody>
+      </p:sp>
+    </p:spTree>
+  </p:cSld>
+  <p:clrMapOvr>
+    <a:masterClrMapping/>
+  </p:clrMapOvr>
+  <p:transition/>
+</p:sld>
+</file>
+
+<file path=ppt/slides/slide12.xml><?xml version="1.0" encoding="utf-8"?>
+<p:sld xmlns:a="http://schemas.openxmlformats.org/drawingml/2006/main" xmlns:r="http://schemas.openxmlformats.org/officeDocument/2006/relationships" xmlns:p="http://schemas.openxmlformats.org/presentationml/2006/main">
+  <p:cSld>
+    <p:spTree>
+      <p:nvGrpSpPr>
+        <p:cNvPr id="1" name=""/>
+        <p:cNvGrpSpPr/>
+        <p:nvPr/>
+      </p:nvGrpSpPr>
+      <p:grpSpPr>
+        <a:xfrm>
+          <a:off x="0" y="0"/>
+          <a:ext cx="0" cy="0"/>
+          <a:chOff x="0" y="0"/>
+          <a:chExt cx="0" cy="0"/>
+        </a:xfrm>
+      </p:grpSpPr>
+      <p:sp>
+        <p:nvSpPr>
           <p:cNvPr id="5" name="Rectangle 4"/>
           <p:cNvSpPr/>
           <p:nvPr/>
@@ -5823,7 +7108,7 @@
 </p:sld>
 </file>
 
-<file path=ppt/slides/slide11.xml><?xml version="1.0" encoding="utf-8"?>
+<file path=ppt/slides/slide13.xml><?xml version="1.0" encoding="utf-8"?>
 <p:sld xmlns:a="http://schemas.openxmlformats.org/drawingml/2006/main" xmlns:r="http://schemas.openxmlformats.org/officeDocument/2006/relationships" xmlns:p="http://schemas.openxmlformats.org/presentationml/2006/main" show="0">
   <p:cSld>
     <p:spTree>
@@ -6051,7 +7336,7 @@
 </p:sld>
 </file>
 
-<file path=ppt/slides/slide12.xml><?xml version="1.0" encoding="utf-8"?>
+<file path=ppt/slides/slide14.xml><?xml version="1.0" encoding="utf-8"?>
 <p:sld xmlns:a="http://schemas.openxmlformats.org/drawingml/2006/main" xmlns:r="http://schemas.openxmlformats.org/officeDocument/2006/relationships" xmlns:p="http://schemas.openxmlformats.org/presentationml/2006/main" show="0">
   <p:cSld>
     <p:spTree>
@@ -7115,7 +8400,7 @@
 </p:sld>
 </file>
 
-<file path=ppt/slides/slide13.xml><?xml version="1.0" encoding="utf-8"?>
+<file path=ppt/slides/slide15.xml><?xml version="1.0" encoding="utf-8"?>
 <p:sld xmlns:a="http://schemas.openxmlformats.org/drawingml/2006/main" xmlns:r="http://schemas.openxmlformats.org/officeDocument/2006/relationships" xmlns:p="http://schemas.openxmlformats.org/presentationml/2006/main" show="0">
   <p:cSld>
     <p:spTree>
@@ -8167,7 +9452,7 @@
 </p:sld>
 </file>
 
-<file path=ppt/slides/slide14.xml><?xml version="1.0" encoding="utf-8"?>
+<file path=ppt/slides/slide16.xml><?xml version="1.0" encoding="utf-8"?>
 <p:sld xmlns:a="http://schemas.openxmlformats.org/drawingml/2006/main" xmlns:r="http://schemas.openxmlformats.org/officeDocument/2006/relationships" xmlns:p="http://schemas.openxmlformats.org/presentationml/2006/main">
   <p:cSld>
     <p:spTree>
@@ -8331,7 +9616,7 @@
 </p:sld>
 </file>
 
-<file path=ppt/slides/slide15.xml><?xml version="1.0" encoding="utf-8"?>
+<file path=ppt/slides/slide17.xml><?xml version="1.0" encoding="utf-8"?>
 <p:sld xmlns:a="http://schemas.openxmlformats.org/drawingml/2006/main" xmlns:r="http://schemas.openxmlformats.org/officeDocument/2006/relationships" xmlns:p="http://schemas.openxmlformats.org/presentationml/2006/main">
   <p:cSld>
     <p:spTree>
@@ -8362,7 +9647,7 @@
           <a:p>
             <a:pPr algn="ctr"/>
             <a:r>
-              <a:rPr lang="" altLang="en-US" b="1">
+              <a:rPr lang="en-US" altLang="en-US" b="1">
                 <a:solidFill>
                   <a:schemeClr val="tx2">
                     <a:lumMod val="75000"/>
@@ -8371,7 +9656,7 @@
               </a:rPr>
               <a:t>Q &amp; A</a:t>
             </a:r>
-            <a:endParaRPr lang="" altLang="en-US" b="1">
+            <a:endParaRPr lang="en-US" altLang="en-US" b="1">
               <a:solidFill>
                 <a:schemeClr val="tx2">
                   <a:lumMod val="75000"/>
@@ -8661,7 +9946,7 @@
                 </a:solidFill>
                 <a:cs typeface="+mn-lt"/>
               </a:rPr>
-              <a:t>A web based platform to connect </a:t>
+              <a:t>A web based platform to connect Customers (</a:t>
             </a:r>
             <a:r>
               <a:rPr lang="en-US" altLang="en-US" b="1" dirty="0">
@@ -8672,7 +9957,7 @@
                 </a:solidFill>
                 <a:cs typeface="+mn-lt"/>
               </a:rPr>
-              <a:t>Event planners</a:t>
+              <a:t>need to plan an event)</a:t>
             </a:r>
             <a:r>
               <a:rPr lang="en-US" altLang="en-US" b="1" dirty="0">
@@ -8683,7 +9968,7 @@
                 </a:solidFill>
                 <a:cs typeface="+mn-lt"/>
               </a:rPr>
-              <a:t> and </a:t>
+              <a:t> to </a:t>
             </a:r>
             <a:r>
               <a:rPr lang="en-US" altLang="en-US" b="1" dirty="0">
@@ -8854,7 +10139,7 @@
           </a:stretch>
         </p:blipFill>
         <p:spPr>
-          <a:xfrm rot="180000">
+          <a:xfrm>
             <a:off x="7046595" y="2727325"/>
             <a:ext cx="4369435" cy="2509520"/>
           </a:xfrm>
@@ -8872,6 +10157,30 @@
             <a:camera prst="perspectiveHeroicExtremeLeftFacing"/>
             <a:lightRig rig="threePt" dir="t"/>
           </a:scene3d>
+        </p:spPr>
+      </p:pic>
+      <p:pic>
+        <p:nvPicPr>
+          <p:cNvPr id="6" name="Picture 5" descr="appsm"/>
+          <p:cNvPicPr>
+            <a:picLocks noChangeAspect="1"/>
+          </p:cNvPicPr>
+          <p:nvPr/>
+        </p:nvPicPr>
+        <p:blipFill>
+          <a:blip r:embed="rId3"/>
+          <a:stretch>
+            <a:fillRect/>
+          </a:stretch>
+        </p:blipFill>
+        <p:spPr>
+          <a:xfrm>
+            <a:off x="6650355" y="3249930"/>
+            <a:ext cx="1399540" cy="2487930"/>
+          </a:xfrm>
+          <a:prstGeom prst="rect">
+            <a:avLst/>
+          </a:prstGeom>
         </p:spPr>
       </p:pic>
     </p:spTree>
@@ -12883,7 +14192,7 @@
                 <a:latin typeface="+mn-lt"/>
                 <a:cs typeface="+mn-lt"/>
               </a:rPr>
-              <a:t>Design Patterns..</a:t>
+              <a:t>Design Patterns Used..</a:t>
             </a:r>
             <a:endParaRPr lang="en-US" altLang="en-US" b="1" dirty="0">
               <a:solidFill>
@@ -12995,8 +14304,8 @@
         </p:nvSpPr>
         <p:spPr>
           <a:xfrm>
-            <a:off x="636270" y="2063750"/>
-            <a:ext cx="10936605" cy="4465955"/>
+            <a:off x="636270" y="2160905"/>
+            <a:ext cx="10936605" cy="2011045"/>
           </a:xfrm>
         </p:spPr>
         <p:txBody>
@@ -13055,7 +14364,7 @@
                 </a:solidFill>
                 <a:cs typeface="+mn-lt"/>
               </a:rPr>
-              <a:t>(Ex: Body parser)</a:t>
+              <a:t>(Ex: Body parser, Multer)</a:t>
             </a:r>
             <a:endParaRPr lang="en-US" altLang="en-US" sz="1750" b="1" dirty="0">
               <a:solidFill>
@@ -13150,7 +14459,7 @@
         </p:nvSpPr>
         <p:spPr>
           <a:xfrm>
-            <a:off x="6772910" y="2084070"/>
+            <a:off x="6838950" y="1831340"/>
             <a:ext cx="4574540" cy="596265"/>
           </a:xfrm>
           <a:prstGeom prst="rect">
@@ -13198,7 +14507,7 @@
         </p:nvSpPr>
         <p:spPr>
           <a:xfrm>
-            <a:off x="6278880" y="2101850"/>
+            <a:off x="6377940" y="1833880"/>
             <a:ext cx="5683885" cy="593725"/>
           </a:xfrm>
           <a:prstGeom prst="rect">
@@ -13440,7 +14749,7 @@
         </p:blipFill>
         <p:spPr>
           <a:xfrm>
-            <a:off x="6778625" y="2936875"/>
+            <a:off x="6938010" y="2848610"/>
             <a:ext cx="4634865" cy="2060575"/>
           </a:xfrm>
           <a:prstGeom prst="rect">
@@ -13448,6 +14757,271 @@
           </a:prstGeom>
         </p:spPr>
       </p:pic>
+      <p:sp>
+        <p:nvSpPr>
+          <p:cNvPr id="3" name="Content Placeholder 5"/>
+          <p:cNvSpPr>
+            <a:spLocks noGrp="1"/>
+          </p:cNvSpPr>
+          <p:nvPr/>
+        </p:nvSpPr>
+        <p:spPr>
+          <a:xfrm>
+            <a:off x="260350" y="4095750"/>
+            <a:ext cx="10936605" cy="4465955"/>
+          </a:xfrm>
+          <a:prstGeom prst="rect">
+            <a:avLst/>
+          </a:prstGeom>
+          <a:noFill/>
+          <a:ln w="9525">
+            <a:noFill/>
+          </a:ln>
+        </p:spPr>
+        <p:txBody>
+          <a:bodyPr>
+            <a:normAutofit/>
+          </a:bodyPr>
+          <a:lstStyle>
+            <a:lvl1pPr marL="342900" lvl="0" indent="-342900" algn="l" defTabSz="914400" eaLnBrk="1" fontAlgn="base" latinLnBrk="0" hangingPunct="1">
+              <a:lnSpc>
+                <a:spcPct val="100000"/>
+              </a:lnSpc>
+              <a:spcBef>
+                <a:spcPct val="20000"/>
+              </a:spcBef>
+              <a:spcAft>
+                <a:spcPct val="0"/>
+              </a:spcAft>
+              <a:buChar char="•"/>
+              <a:defRPr sz="3200" b="0" i="0" u="none" kern="1200" baseline="0">
+                <a:solidFill>
+                  <a:schemeClr val="tx1"/>
+                </a:solidFill>
+                <a:latin typeface="+mn-lt"/>
+                <a:ea typeface="+mn-ea"/>
+                <a:cs typeface="+mn-cs"/>
+              </a:defRPr>
+            </a:lvl1pPr>
+            <a:lvl2pPr marL="742950" lvl="1" indent="-285750" algn="l" defTabSz="914400" eaLnBrk="1" fontAlgn="base" latinLnBrk="0" hangingPunct="1">
+              <a:lnSpc>
+                <a:spcPct val="100000"/>
+              </a:lnSpc>
+              <a:spcBef>
+                <a:spcPct val="20000"/>
+              </a:spcBef>
+              <a:spcAft>
+                <a:spcPct val="0"/>
+              </a:spcAft>
+              <a:buChar char="–"/>
+              <a:defRPr sz="2800" b="0" i="0" u="none" kern="1200" baseline="0">
+                <a:solidFill>
+                  <a:schemeClr val="tx1"/>
+                </a:solidFill>
+                <a:latin typeface="+mn-lt"/>
+                <a:ea typeface="+mn-ea"/>
+                <a:cs typeface="+mn-cs"/>
+              </a:defRPr>
+            </a:lvl2pPr>
+            <a:lvl3pPr marL="1143000" lvl="2" indent="-228600" algn="l" defTabSz="914400" eaLnBrk="1" fontAlgn="base" latinLnBrk="0" hangingPunct="1">
+              <a:lnSpc>
+                <a:spcPct val="100000"/>
+              </a:lnSpc>
+              <a:spcBef>
+                <a:spcPct val="20000"/>
+              </a:spcBef>
+              <a:spcAft>
+                <a:spcPct val="0"/>
+              </a:spcAft>
+              <a:buChar char="•"/>
+              <a:defRPr sz="2400" b="0" i="0" u="none" kern="1200" baseline="0">
+                <a:solidFill>
+                  <a:schemeClr val="tx1"/>
+                </a:solidFill>
+                <a:latin typeface="+mn-lt"/>
+                <a:ea typeface="+mn-ea"/>
+                <a:cs typeface="+mn-cs"/>
+              </a:defRPr>
+            </a:lvl3pPr>
+            <a:lvl4pPr marL="1600200" lvl="3" indent="-228600" algn="l" defTabSz="914400" eaLnBrk="1" fontAlgn="base" latinLnBrk="0" hangingPunct="1">
+              <a:lnSpc>
+                <a:spcPct val="100000"/>
+              </a:lnSpc>
+              <a:spcBef>
+                <a:spcPct val="20000"/>
+              </a:spcBef>
+              <a:spcAft>
+                <a:spcPct val="0"/>
+              </a:spcAft>
+              <a:buChar char="–"/>
+              <a:defRPr sz="2000" b="0" i="0" u="none" kern="1200" baseline="0">
+                <a:solidFill>
+                  <a:schemeClr val="tx1"/>
+                </a:solidFill>
+                <a:latin typeface="+mn-lt"/>
+                <a:ea typeface="+mn-ea"/>
+                <a:cs typeface="+mn-cs"/>
+              </a:defRPr>
+            </a:lvl4pPr>
+            <a:lvl5pPr marL="2057400" lvl="4" indent="-228600" algn="l" defTabSz="914400" eaLnBrk="1" fontAlgn="base" latinLnBrk="0" hangingPunct="1">
+              <a:lnSpc>
+                <a:spcPct val="100000"/>
+              </a:lnSpc>
+              <a:spcBef>
+                <a:spcPct val="20000"/>
+              </a:spcBef>
+              <a:spcAft>
+                <a:spcPct val="0"/>
+              </a:spcAft>
+              <a:buChar char="»"/>
+              <a:defRPr sz="2000" b="0" i="0" u="none" kern="1200" baseline="0">
+                <a:solidFill>
+                  <a:schemeClr val="tx1"/>
+                </a:solidFill>
+                <a:latin typeface="+mn-lt"/>
+                <a:ea typeface="+mn-ea"/>
+                <a:cs typeface="+mn-cs"/>
+              </a:defRPr>
+            </a:lvl5pPr>
+            <a:lvl6pPr marL="2514600" lvl="5" indent="-228600" algn="l" defTabSz="914400" eaLnBrk="1" fontAlgn="base" latinLnBrk="0" hangingPunct="1">
+              <a:lnSpc>
+                <a:spcPct val="100000"/>
+              </a:lnSpc>
+              <a:spcBef>
+                <a:spcPct val="20000"/>
+              </a:spcBef>
+              <a:spcAft>
+                <a:spcPct val="0"/>
+              </a:spcAft>
+              <a:buChar char="»"/>
+              <a:defRPr sz="2000" b="0" i="0" u="none" kern="1200" baseline="0">
+                <a:solidFill>
+                  <a:schemeClr val="tx1"/>
+                </a:solidFill>
+                <a:latin typeface="+mn-lt"/>
+                <a:ea typeface="+mn-ea"/>
+                <a:cs typeface="+mn-cs"/>
+              </a:defRPr>
+            </a:lvl6pPr>
+            <a:lvl7pPr marL="2971800" lvl="6" indent="-228600" algn="l" defTabSz="914400" eaLnBrk="1" fontAlgn="base" latinLnBrk="0" hangingPunct="1">
+              <a:lnSpc>
+                <a:spcPct val="100000"/>
+              </a:lnSpc>
+              <a:spcBef>
+                <a:spcPct val="20000"/>
+              </a:spcBef>
+              <a:spcAft>
+                <a:spcPct val="0"/>
+              </a:spcAft>
+              <a:buChar char="»"/>
+              <a:defRPr sz="2000" b="0" i="0" u="none" kern="1200" baseline="0">
+                <a:solidFill>
+                  <a:schemeClr val="tx1"/>
+                </a:solidFill>
+                <a:latin typeface="+mn-lt"/>
+                <a:ea typeface="+mn-ea"/>
+                <a:cs typeface="+mn-cs"/>
+              </a:defRPr>
+            </a:lvl7pPr>
+            <a:lvl8pPr marL="3429000" lvl="7" indent="-228600" algn="l" defTabSz="914400" eaLnBrk="1" fontAlgn="base" latinLnBrk="0" hangingPunct="1">
+              <a:lnSpc>
+                <a:spcPct val="100000"/>
+              </a:lnSpc>
+              <a:spcBef>
+                <a:spcPct val="20000"/>
+              </a:spcBef>
+              <a:spcAft>
+                <a:spcPct val="0"/>
+              </a:spcAft>
+              <a:buChar char="»"/>
+              <a:defRPr sz="2000" b="0" i="0" u="none" kern="1200" baseline="0">
+                <a:solidFill>
+                  <a:schemeClr val="tx1"/>
+                </a:solidFill>
+                <a:latin typeface="+mn-lt"/>
+                <a:ea typeface="+mn-ea"/>
+                <a:cs typeface="+mn-cs"/>
+              </a:defRPr>
+            </a:lvl8pPr>
+            <a:lvl9pPr marL="3886200" lvl="8" indent="-228600" algn="l" defTabSz="914400" eaLnBrk="1" fontAlgn="base" latinLnBrk="0" hangingPunct="1">
+              <a:lnSpc>
+                <a:spcPct val="100000"/>
+              </a:lnSpc>
+              <a:spcBef>
+                <a:spcPct val="20000"/>
+              </a:spcBef>
+              <a:spcAft>
+                <a:spcPct val="0"/>
+              </a:spcAft>
+              <a:buChar char="»"/>
+              <a:defRPr sz="2000" b="0" i="0" u="none" kern="1200" baseline="0">
+                <a:solidFill>
+                  <a:schemeClr val="tx1"/>
+                </a:solidFill>
+                <a:latin typeface="+mn-lt"/>
+                <a:ea typeface="+mn-ea"/>
+                <a:cs typeface="+mn-cs"/>
+              </a:defRPr>
+            </a:lvl9pPr>
+          </a:lstStyle>
+          <a:p>
+            <a:pPr lvl="1" algn="l">
+              <a:lnSpc>
+                <a:spcPct val="150000"/>
+              </a:lnSpc>
+              <a:buFont typeface="Arial" panose="02080604020202020204" pitchFamily="34" charset="0"/>
+              <a:buChar char="•"/>
+            </a:pPr>
+            <a:r>
+              <a:rPr lang="en-US" altLang="en-US" sz="2000" b="1" dirty="0">
+                <a:solidFill>
+                  <a:schemeClr val="accent1">
+                    <a:lumMod val="50000"/>
+                  </a:schemeClr>
+                </a:solidFill>
+                <a:cs typeface="+mn-lt"/>
+              </a:rPr>
+              <a:t>OOP Concepts</a:t>
+            </a:r>
+            <a:endParaRPr lang="en-US" altLang="en-US" sz="2000" b="1" dirty="0">
+              <a:solidFill>
+                <a:schemeClr val="accent1">
+                  <a:lumMod val="50000"/>
+                </a:schemeClr>
+              </a:solidFill>
+              <a:cs typeface="+mn-lt"/>
+            </a:endParaRPr>
+          </a:p>
+          <a:p>
+            <a:pPr lvl="1" algn="l">
+              <a:lnSpc>
+                <a:spcPct val="150000"/>
+              </a:lnSpc>
+              <a:buFont typeface="Arial" panose="02080604020202020204" pitchFamily="34" charset="0"/>
+              <a:buChar char="•"/>
+            </a:pPr>
+            <a:r>
+              <a:rPr lang="en-US" altLang="en-US" sz="2000" b="1" dirty="0">
+                <a:solidFill>
+                  <a:schemeClr val="accent1">
+                    <a:lumMod val="50000"/>
+                  </a:schemeClr>
+                </a:solidFill>
+                <a:cs typeface="+mn-lt"/>
+              </a:rPr>
+              <a:t>Code Formatting &amp; Best Practises</a:t>
+            </a:r>
+            <a:endParaRPr lang="en-US" altLang="en-US" sz="2000" b="1" dirty="0">
+              <a:solidFill>
+                <a:schemeClr val="accent1">
+                  <a:lumMod val="50000"/>
+                </a:schemeClr>
+              </a:solidFill>
+              <a:cs typeface="+mn-lt"/>
+            </a:endParaRPr>
+          </a:p>
+        </p:txBody>
+      </p:sp>
     </p:spTree>
   </p:cSld>
   <p:clrMapOvr>
@@ -13870,7 +15444,7 @@
         </p:spPr>
         <p:txBody>
           <a:bodyPr>
-            <a:normAutofit fontScale="90000" lnSpcReduction="20000"/>
+            <a:normAutofit lnSpcReduction="20000"/>
           </a:bodyPr>
           <a:p>
             <a:pPr algn="l">
@@ -14069,7 +15643,7 @@
                 </a:solidFill>
                 <a:cs typeface="+mn-lt"/>
               </a:rPr>
-              <a:t>chart.js - Data visualization &amp; Report generation</a:t>
+              <a:t>chart.js/ Mongo Charts - Reports &amp; Charts visualization</a:t>
             </a:r>
             <a:endParaRPr lang="en-US" altLang="en-US" sz="2000" b="1" dirty="0">
               <a:solidFill>
@@ -14095,7 +15669,7 @@
                 </a:solidFill>
                 <a:cs typeface="+mn-lt"/>
               </a:rPr>
-              <a:t>Google Maps API - Location Services</a:t>
+              <a:t>Node Corn - Schedule and Manage tasks</a:t>
             </a:r>
             <a:endParaRPr lang="en-US" altLang="en-US" sz="2000" b="1" dirty="0">
               <a:solidFill>
@@ -14112,18 +15686,7 @@
                 <a:spcPct val="150000"/>
               </a:lnSpc>
             </a:pPr>
-            <a:r>
-              <a:rPr lang="" altLang="en-US" sz="2000" b="1" dirty="0">
-                <a:solidFill>
-                  <a:schemeClr val="accent1">
-                    <a:lumMod val="50000"/>
-                  </a:schemeClr>
-                </a:solidFill>
-                <a:cs typeface="+mn-lt"/>
-              </a:rPr>
-              <a:t>PayPal API - Payment Collection</a:t>
-            </a:r>
-            <a:endParaRPr lang="" altLang="en-US" sz="2000" b="1" dirty="0">
+            <a:endParaRPr lang="en-US" altLang="en-US" sz="2000" b="1" dirty="0">
               <a:solidFill>
                 <a:schemeClr val="accent1">
                   <a:lumMod val="50000"/>

</xml_diff>